<commit_message>
Synced with upstream master
</commit_message>
<xml_diff>
--- a/04_ExploratoryAnalysis/ggplot2/ppt/ggplot2.pptx
+++ b/04_ExploratoryAnalysis/ggplot2/ppt/ggplot2.pptx
@@ -234,7 +234,7 @@
           </a:lstStyle>
           <a:p>
             <a:fld id="{26588BF7-5BFF-FB4D-8C1A-970B23591857}" type="datetimeFigureOut">
-              <a:t>2/4/14</a:t>
+              <a:t>4/25/2015</a:t>
             </a:fld>
             <a:endParaRPr lang="en-US"/>
           </a:p>
@@ -761,7 +761,7 @@
           <a:lstStyle/>
           <a:p>
             <a:fld id="{A65958ED-12ED-1142-8369-DADF60CDC5D9}" type="datetimeFigureOut">
-              <a:t>2/4/14</a:t>
+              <a:t>4/25/2015</a:t>
             </a:fld>
             <a:endParaRPr lang="en-US"/>
           </a:p>
@@ -927,7 +927,7 @@
           <a:lstStyle/>
           <a:p>
             <a:fld id="{A65958ED-12ED-1142-8369-DADF60CDC5D9}" type="datetimeFigureOut">
-              <a:t>2/4/14</a:t>
+              <a:t>4/25/2015</a:t>
             </a:fld>
             <a:endParaRPr lang="en-US"/>
           </a:p>
@@ -1103,7 +1103,7 @@
           <a:lstStyle/>
           <a:p>
             <a:fld id="{A65958ED-12ED-1142-8369-DADF60CDC5D9}" type="datetimeFigureOut">
-              <a:t>2/4/14</a:t>
+              <a:t>4/25/2015</a:t>
             </a:fld>
             <a:endParaRPr lang="en-US"/>
           </a:p>
@@ -1269,7 +1269,7 @@
           <a:lstStyle/>
           <a:p>
             <a:fld id="{A65958ED-12ED-1142-8369-DADF60CDC5D9}" type="datetimeFigureOut">
-              <a:t>2/4/14</a:t>
+              <a:t>4/25/2015</a:t>
             </a:fld>
             <a:endParaRPr lang="en-US"/>
           </a:p>
@@ -1512,7 +1512,7 @@
           <a:lstStyle/>
           <a:p>
             <a:fld id="{A65958ED-12ED-1142-8369-DADF60CDC5D9}" type="datetimeFigureOut">
-              <a:t>2/4/14</a:t>
+              <a:t>4/25/2015</a:t>
             </a:fld>
             <a:endParaRPr lang="en-US"/>
           </a:p>
@@ -1795,7 +1795,7 @@
           <a:lstStyle/>
           <a:p>
             <a:fld id="{A65958ED-12ED-1142-8369-DADF60CDC5D9}" type="datetimeFigureOut">
-              <a:t>2/4/14</a:t>
+              <a:t>4/25/2015</a:t>
             </a:fld>
             <a:endParaRPr lang="en-US"/>
           </a:p>
@@ -2217,7 +2217,7 @@
           <a:lstStyle/>
           <a:p>
             <a:fld id="{A65958ED-12ED-1142-8369-DADF60CDC5D9}" type="datetimeFigureOut">
-              <a:t>2/4/14</a:t>
+              <a:t>4/25/2015</a:t>
             </a:fld>
             <a:endParaRPr lang="en-US"/>
           </a:p>
@@ -2332,7 +2332,7 @@
           <a:lstStyle/>
           <a:p>
             <a:fld id="{A65958ED-12ED-1142-8369-DADF60CDC5D9}" type="datetimeFigureOut">
-              <a:t>2/4/14</a:t>
+              <a:t>4/25/2015</a:t>
             </a:fld>
             <a:endParaRPr lang="en-US"/>
           </a:p>
@@ -2425,7 +2425,7 @@
           <a:lstStyle/>
           <a:p>
             <a:fld id="{A65958ED-12ED-1142-8369-DADF60CDC5D9}" type="datetimeFigureOut">
-              <a:t>2/4/14</a:t>
+              <a:t>4/25/2015</a:t>
             </a:fld>
             <a:endParaRPr lang="en-US"/>
           </a:p>
@@ -2698,7 +2698,7 @@
           <a:lstStyle/>
           <a:p>
             <a:fld id="{A65958ED-12ED-1142-8369-DADF60CDC5D9}" type="datetimeFigureOut">
-              <a:t>2/4/14</a:t>
+              <a:t>4/25/2015</a:t>
             </a:fld>
             <a:endParaRPr lang="en-US"/>
           </a:p>
@@ -2948,7 +2948,7 @@
           <a:lstStyle/>
           <a:p>
             <a:fld id="{A65958ED-12ED-1142-8369-DADF60CDC5D9}" type="datetimeFigureOut">
-              <a:t>2/4/14</a:t>
+              <a:t>4/25/2015</a:t>
             </a:fld>
             <a:endParaRPr lang="en-US"/>
           </a:p>
@@ -3157,7 +3157,7 @@
           </a:lstStyle>
           <a:p>
             <a:fld id="{A65958ED-12ED-1142-8369-DADF60CDC5D9}" type="datetimeFigureOut">
-              <a:t>2/4/14</a:t>
+              <a:t>4/25/2015</a:t>
             </a:fld>
             <a:endParaRPr lang="en-US"/>
           </a:p>
@@ -3586,11 +3586,7 @@
           <a:p>
             <a:r>
               <a:rPr lang="en-US" sz="2400" i="1"/>
-              <a:t>Roger D. Peng, </a:t>
-            </a:r>
-            <a:r>
-              <a:rPr lang="en-US" sz="2400" i="1"/>
-              <a:t>Associate Professor of Biostatistics</a:t>
+              <a:t>Roger D. Peng, Associate Professor of Biostatistics</a:t>
             </a:r>
           </a:p>
           <a:p>
@@ -3614,7 +3610,7 @@
   <p:timing>
     <p:tnLst>
       <p:par>
-        <p:cTn xmlns:p14="http://schemas.microsoft.com/office/powerpoint/2010/main" id="1" dur="indefinite" restart="never" nodeType="tmRoot"/>
+        <p:cTn id="1" dur="indefinite" restart="never" nodeType="tmRoot"/>
       </p:par>
     </p:tnLst>
   </p:timing>
@@ -3713,8 +3709,36 @@
           <a:lstStyle/>
           <a:p>
             <a:r>
-              <a:rPr lang="en-US"/>
-              <a:t>qplot(displ, hwy, data = mpg, geom = c("point", "smooth"))</a:t>
+              <a:rPr lang="en-US" dirty="0" err="1"/>
+              <a:t>qplot</a:t>
+            </a:r>
+            <a:r>
+              <a:rPr lang="en-US" dirty="0"/>
+              <a:t>(</a:t>
+            </a:r>
+            <a:r>
+              <a:rPr lang="en-US" dirty="0" err="1"/>
+              <a:t>displ</a:t>
+            </a:r>
+            <a:r>
+              <a:rPr lang="en-US" dirty="0"/>
+              <a:t>, </a:t>
+            </a:r>
+            <a:r>
+              <a:rPr lang="en-US" dirty="0" err="1"/>
+              <a:t>hwy</a:t>
+            </a:r>
+            <a:r>
+              <a:rPr lang="en-US" dirty="0"/>
+              <a:t>, data = mpg, </a:t>
+            </a:r>
+            <a:r>
+              <a:rPr lang="en-US" dirty="0" err="1"/>
+              <a:t>geom</a:t>
+            </a:r>
+            <a:r>
+              <a:rPr lang="en-US" dirty="0"/>
+              <a:t> = c("point", "smooth"))</a:t>
             </a:r>
           </a:p>
         </p:txBody>
@@ -3732,7 +3756,7 @@
   <p:timing>
     <p:tnLst>
       <p:par>
-        <p:cTn xmlns:p14="http://schemas.microsoft.com/office/powerpoint/2010/main" id="1" dur="indefinite" restart="never" nodeType="tmRoot"/>
+        <p:cTn id="1" dur="indefinite" restart="never" nodeType="tmRoot"/>
       </p:par>
     </p:tnLst>
   </p:timing>
@@ -3831,8 +3855,28 @@
           <a:lstStyle/>
           <a:p>
             <a:r>
-              <a:rPr lang="en-US"/>
-              <a:t>qplot(hwy, data = mpg, fill = drv)</a:t>
+              <a:rPr lang="en-US" dirty="0" err="1"/>
+              <a:t>qplot</a:t>
+            </a:r>
+            <a:r>
+              <a:rPr lang="en-US" dirty="0"/>
+              <a:t>(</a:t>
+            </a:r>
+            <a:r>
+              <a:rPr lang="en-US" dirty="0" err="1"/>
+              <a:t>hwy</a:t>
+            </a:r>
+            <a:r>
+              <a:rPr lang="en-US" dirty="0"/>
+              <a:t>, data = mpg, fill = </a:t>
+            </a:r>
+            <a:r>
+              <a:rPr lang="en-US" dirty="0" err="1"/>
+              <a:t>drv</a:t>
+            </a:r>
+            <a:r>
+              <a:rPr lang="en-US" dirty="0"/>
+              <a:t>)</a:t>
             </a:r>
           </a:p>
         </p:txBody>
@@ -3850,7 +3894,7 @@
   <p:timing>
     <p:tnLst>
       <p:par>
-        <p:cTn xmlns:p14="http://schemas.microsoft.com/office/powerpoint/2010/main" id="1" dur="indefinite" restart="never" nodeType="tmRoot"/>
+        <p:cTn id="1" dur="indefinite" restart="never" nodeType="tmRoot"/>
       </p:par>
     </p:tnLst>
   </p:timing>
@@ -4047,7 +4091,7 @@
   <p:timing>
     <p:tnLst>
       <p:par>
-        <p:cTn xmlns:p14="http://schemas.microsoft.com/office/powerpoint/2010/main" id="1" dur="indefinite" restart="never" nodeType="tmRoot"/>
+        <p:cTn id="1" dur="indefinite" restart="never" nodeType="tmRoot"/>
       </p:par>
     </p:tnLst>
   </p:timing>
@@ -4154,7 +4198,7 @@
   <p:timing>
     <p:tnLst>
       <p:par>
-        <p:cTn xmlns:p14="http://schemas.microsoft.com/office/powerpoint/2010/main" id="1" dur="indefinite" restart="never" nodeType="tmRoot"/>
+        <p:cTn id="1" dur="indefinite" restart="never" nodeType="tmRoot"/>
       </p:par>
     </p:tnLst>
   </p:timing>
@@ -4471,7 +4515,7 @@
   <p:timing>
     <p:tnLst>
       <p:par>
-        <p:cTn xmlns:p14="http://schemas.microsoft.com/office/powerpoint/2010/main" id="1" dur="indefinite" restart="never" nodeType="tmRoot">
+        <p:cTn id="1" dur="indefinite" restart="never" nodeType="tmRoot">
           <p:childTnLst>
             <p:seq concurrent="1" nextAc="seek">
               <p:cTn id="2" dur="indefinite" nodeType="mainSeq">
@@ -4833,7 +4877,7 @@
   <p:timing>
     <p:tnLst>
       <p:par>
-        <p:cTn xmlns:p14="http://schemas.microsoft.com/office/powerpoint/2010/main" id="1" dur="indefinite" restart="never" nodeType="tmRoot"/>
+        <p:cTn id="1" dur="indefinite" restart="never" nodeType="tmRoot"/>
       </p:par>
     </p:tnLst>
   </p:timing>
@@ -4951,7 +4995,7 @@
   <p:timing>
     <p:tnLst>
       <p:par>
-        <p:cTn xmlns:p14="http://schemas.microsoft.com/office/powerpoint/2010/main" id="1" dur="indefinite" restart="never" nodeType="tmRoot"/>
+        <p:cTn id="1" dur="indefinite" restart="never" nodeType="tmRoot"/>
       </p:par>
     </p:tnLst>
   </p:timing>
@@ -4991,7 +5035,7 @@
           <a:lstStyle/>
           <a:p>
             <a:r>
-              <a:rPr lang="en-US"/>
+              <a:rPr lang="en-US" dirty="0"/>
               <a:t>Density Smooth</a:t>
             </a:r>
           </a:p>
@@ -5128,7 +5172,7 @@
   <p:timing>
     <p:tnLst>
       <p:par>
-        <p:cTn xmlns:p14="http://schemas.microsoft.com/office/powerpoint/2010/main" id="1" dur="indefinite" restart="never" nodeType="tmRoot"/>
+        <p:cTn id="1" dur="indefinite" restart="never" nodeType="tmRoot"/>
       </p:par>
     </p:tnLst>
   </p:timing>
@@ -5383,7 +5427,7 @@
   <p:timing>
     <p:tnLst>
       <p:par>
-        <p:cTn xmlns:p14="http://schemas.microsoft.com/office/powerpoint/2010/main" id="1" dur="indefinite" restart="never" nodeType="tmRoot"/>
+        <p:cTn id="1" dur="indefinite" restart="never" nodeType="tmRoot"/>
       </p:par>
     </p:tnLst>
   </p:timing>
@@ -5409,94 +5453,6 @@
       </p:grpSpPr>
       <p:sp>
         <p:nvSpPr>
-          <p:cNvPr id="2" name="Title 1"/>
-          <p:cNvSpPr>
-            <a:spLocks noGrp="1"/>
-          </p:cNvSpPr>
-          <p:nvPr>
-            <p:ph type="title"/>
-          </p:nvPr>
-        </p:nvSpPr>
-        <p:spPr/>
-        <p:txBody>
-          <a:bodyPr>
-            <a:normAutofit/>
-          </a:bodyPr>
-          <a:lstStyle/>
-          <a:p>
-            <a:r>
-              <a:rPr lang="en-US"/>
-              <a:t>Scatterplots: eNO vs. PM</a:t>
-            </a:r>
-            <a:r>
-              <a:rPr lang="en-US" baseline="-25000"/>
-              <a:t>2.5</a:t>
-            </a:r>
-            <a:endParaRPr lang="en-US"/>
-          </a:p>
-        </p:txBody>
-      </p:sp>
-      <p:pic>
-        <p:nvPicPr>
-          <p:cNvPr id="3" name="Picture 2" descr="maacs8.pdf"/>
-          <p:cNvPicPr>
-            <a:picLocks noChangeAspect="1"/>
-          </p:cNvPicPr>
-          <p:nvPr/>
-        </p:nvPicPr>
-        <p:blipFill>
-          <a:blip r:embed="rId2">
-            <a:extLst>
-              <a:ext uri="{28A0092B-C50C-407E-A947-70E740481C1C}">
-                <a14:useLocalDpi xmlns:a14="http://schemas.microsoft.com/office/drawing/2010/main" val="0"/>
-              </a:ext>
-            </a:extLst>
-          </a:blip>
-          <a:stretch>
-            <a:fillRect/>
-          </a:stretch>
-        </p:blipFill>
-        <p:spPr>
-          <a:xfrm>
-            <a:off x="1752176" y="975633"/>
-            <a:ext cx="5703154" cy="3616368"/>
-          </a:xfrm>
-          <a:prstGeom prst="rect">
-            <a:avLst/>
-          </a:prstGeom>
-        </p:spPr>
-      </p:pic>
-      <p:sp>
-        <p:nvSpPr>
-          <p:cNvPr id="4" name="TextBox 3"/>
-          <p:cNvSpPr txBox="1"/>
-          <p:nvPr/>
-        </p:nvSpPr>
-        <p:spPr>
-          <a:xfrm>
-            <a:off x="197057" y="4635799"/>
-            <a:ext cx="8676975" cy="338554"/>
-          </a:xfrm>
-          <a:prstGeom prst="rect">
-            <a:avLst/>
-          </a:prstGeom>
-          <a:noFill/>
-        </p:spPr>
-        <p:txBody>
-          <a:bodyPr wrap="none" rtlCol="0">
-            <a:spAutoFit/>
-          </a:bodyPr>
-          <a:lstStyle/>
-          <a:p>
-            <a:r>
-              <a:rPr lang="en-US" sz="1600"/>
-              <a:t>qplot(log(pm25), log(eno), data = maacs, color = mopos, geom = c("point", "smooth"), method = "lm")</a:t>
-            </a:r>
-          </a:p>
-        </p:txBody>
-      </p:sp>
-      <p:sp>
-        <p:nvSpPr>
           <p:cNvPr id="5" name="Rectangle 4"/>
           <p:cNvSpPr/>
           <p:nvPr/>
@@ -5615,6 +5571,130 @@
           </a:p>
         </p:txBody>
       </p:sp>
+      <p:sp>
+        <p:nvSpPr>
+          <p:cNvPr id="2" name="Title 1"/>
+          <p:cNvSpPr>
+            <a:spLocks noGrp="1"/>
+          </p:cNvSpPr>
+          <p:nvPr>
+            <p:ph type="title"/>
+          </p:nvPr>
+        </p:nvSpPr>
+        <p:spPr/>
+        <p:txBody>
+          <a:bodyPr>
+            <a:normAutofit/>
+          </a:bodyPr>
+          <a:lstStyle/>
+          <a:p>
+            <a:r>
+              <a:rPr lang="en-US"/>
+              <a:t>Scatterplots: eNO vs. PM</a:t>
+            </a:r>
+            <a:r>
+              <a:rPr lang="en-US" baseline="-25000"/>
+              <a:t>2.5</a:t>
+            </a:r>
+            <a:endParaRPr lang="en-US"/>
+          </a:p>
+        </p:txBody>
+      </p:sp>
+      <p:pic>
+        <p:nvPicPr>
+          <p:cNvPr id="3" name="Picture 2" descr="maacs8.pdf"/>
+          <p:cNvPicPr>
+            <a:picLocks noChangeAspect="1"/>
+          </p:cNvPicPr>
+          <p:nvPr/>
+        </p:nvPicPr>
+        <p:blipFill>
+          <a:blip r:embed="rId2">
+            <a:extLst>
+              <a:ext uri="{28A0092B-C50C-407E-A947-70E740481C1C}">
+                <a14:useLocalDpi xmlns:a14="http://schemas.microsoft.com/office/drawing/2010/main" val="0"/>
+              </a:ext>
+            </a:extLst>
+          </a:blip>
+          <a:stretch>
+            <a:fillRect/>
+          </a:stretch>
+        </p:blipFill>
+        <p:spPr>
+          <a:xfrm>
+            <a:off x="1752176" y="975633"/>
+            <a:ext cx="5703154" cy="3616368"/>
+          </a:xfrm>
+          <a:prstGeom prst="rect">
+            <a:avLst/>
+          </a:prstGeom>
+        </p:spPr>
+      </p:pic>
+      <p:sp>
+        <p:nvSpPr>
+          <p:cNvPr id="4" name="TextBox 3"/>
+          <p:cNvSpPr txBox="1"/>
+          <p:nvPr/>
+        </p:nvSpPr>
+        <p:spPr>
+          <a:xfrm>
+            <a:off x="197057" y="4635799"/>
+            <a:ext cx="8676975" cy="338554"/>
+          </a:xfrm>
+          <a:prstGeom prst="rect">
+            <a:avLst/>
+          </a:prstGeom>
+          <a:noFill/>
+        </p:spPr>
+        <p:txBody>
+          <a:bodyPr wrap="none" rtlCol="0">
+            <a:spAutoFit/>
+          </a:bodyPr>
+          <a:lstStyle/>
+          <a:p>
+            <a:r>
+              <a:rPr lang="en-US" sz="1600" dirty="0" err="1"/>
+              <a:t>qplot</a:t>
+            </a:r>
+            <a:r>
+              <a:rPr lang="en-US" sz="1600" dirty="0"/>
+              <a:t>(log(pm25), log(</a:t>
+            </a:r>
+            <a:r>
+              <a:rPr lang="en-US" sz="1600" dirty="0" err="1"/>
+              <a:t>eno</a:t>
+            </a:r>
+            <a:r>
+              <a:rPr lang="en-US" sz="1600" dirty="0"/>
+              <a:t>), data = </a:t>
+            </a:r>
+            <a:r>
+              <a:rPr lang="en-US" sz="1600" dirty="0" err="1"/>
+              <a:t>maacs</a:t>
+            </a:r>
+            <a:r>
+              <a:rPr lang="en-US" sz="1600" dirty="0"/>
+              <a:t>, color = </a:t>
+            </a:r>
+            <a:r>
+              <a:rPr lang="en-US" sz="1600" dirty="0" err="1"/>
+              <a:t>mopos</a:t>
+            </a:r>
+            <a:r>
+              <a:rPr lang="en-US" sz="1600" dirty="0"/>
+              <a:t>, </a:t>
+            </a:r>
+            <a:r>
+              <a:rPr lang="en-US" sz="1600" dirty="0" err="1"/>
+              <a:t>geom</a:t>
+            </a:r>
+            <a:r>
+              <a:rPr lang="en-US" sz="1600" dirty="0"/>
+              <a:t> = c("point", "smooth"), method = "lm")</a:t>
+            </a:r>
+          </a:p>
+        </p:txBody>
+      </p:sp>
     </p:spTree>
     <p:extLst>
       <p:ext uri="{BB962C8B-B14F-4D97-AF65-F5344CB8AC3E}">
@@ -5628,7 +5708,7 @@
   <p:timing>
     <p:tnLst>
       <p:par>
-        <p:cTn xmlns:p14="http://schemas.microsoft.com/office/powerpoint/2010/main" id="1" dur="indefinite" restart="never" nodeType="tmRoot">
+        <p:cTn id="1" dur="indefinite" restart="never" nodeType="tmRoot">
           <p:childTnLst>
             <p:seq concurrent="1" nextAc="seek">
               <p:cTn id="2" dur="indefinite" nodeType="mainSeq">
@@ -5917,92 +5997,6 @@
       </p:grpSpPr>
       <p:sp>
         <p:nvSpPr>
-          <p:cNvPr id="2" name="Title 1"/>
-          <p:cNvSpPr>
-            <a:spLocks noGrp="1"/>
-          </p:cNvSpPr>
-          <p:nvPr>
-            <p:ph type="title"/>
-          </p:nvPr>
-        </p:nvSpPr>
-        <p:spPr/>
-        <p:txBody>
-          <a:bodyPr/>
-          <a:lstStyle/>
-          <a:p>
-            <a:r>
-              <a:rPr lang="en-US"/>
-              <a:t>Scatterplots: eNO vs. PM</a:t>
-            </a:r>
-            <a:r>
-              <a:rPr lang="en-US" baseline="-25000"/>
-              <a:t>2.5</a:t>
-            </a:r>
-            <a:endParaRPr lang="en-US"/>
-          </a:p>
-        </p:txBody>
-      </p:sp>
-      <p:pic>
-        <p:nvPicPr>
-          <p:cNvPr id="3" name="Picture 2" descr="maacs9.pdf"/>
-          <p:cNvPicPr>
-            <a:picLocks noChangeAspect="1"/>
-          </p:cNvPicPr>
-          <p:nvPr/>
-        </p:nvPicPr>
-        <p:blipFill>
-          <a:blip r:embed="rId2">
-            <a:extLst>
-              <a:ext uri="{28A0092B-C50C-407E-A947-70E740481C1C}">
-                <a14:useLocalDpi xmlns:a14="http://schemas.microsoft.com/office/drawing/2010/main" val="0"/>
-              </a:ext>
-            </a:extLst>
-          </a:blip>
-          <a:stretch>
-            <a:fillRect/>
-          </a:stretch>
-        </p:blipFill>
-        <p:spPr>
-          <a:xfrm>
-            <a:off x="1028700" y="933690"/>
-            <a:ext cx="7073900" cy="3670300"/>
-          </a:xfrm>
-          <a:prstGeom prst="rect">
-            <a:avLst/>
-          </a:prstGeom>
-        </p:spPr>
-      </p:pic>
-      <p:sp>
-        <p:nvSpPr>
-          <p:cNvPr id="4" name="TextBox 3"/>
-          <p:cNvSpPr txBox="1"/>
-          <p:nvPr/>
-        </p:nvSpPr>
-        <p:spPr>
-          <a:xfrm>
-            <a:off x="77631" y="4675415"/>
-            <a:ext cx="9000681" cy="338554"/>
-          </a:xfrm>
-          <a:prstGeom prst="rect">
-            <a:avLst/>
-          </a:prstGeom>
-          <a:noFill/>
-        </p:spPr>
-        <p:txBody>
-          <a:bodyPr wrap="none" rtlCol="0">
-            <a:spAutoFit/>
-          </a:bodyPr>
-          <a:lstStyle/>
-          <a:p>
-            <a:r>
-              <a:rPr lang="en-US" sz="1600"/>
-              <a:t>qplot(log(pm25), log(eno), data = maacs, geom = c("point", "smooth"), method = "lm", facets = . ~ mopos)</a:t>
-            </a:r>
-          </a:p>
-        </p:txBody>
-      </p:sp>
-      <p:sp>
-        <p:nvSpPr>
           <p:cNvPr id="5" name="Rectangle 4"/>
           <p:cNvSpPr/>
           <p:nvPr/>
@@ -6061,6 +6055,128 @@
           </a:p>
         </p:txBody>
       </p:sp>
+      <p:sp>
+        <p:nvSpPr>
+          <p:cNvPr id="2" name="Title 1"/>
+          <p:cNvSpPr>
+            <a:spLocks noGrp="1"/>
+          </p:cNvSpPr>
+          <p:nvPr>
+            <p:ph type="title"/>
+          </p:nvPr>
+        </p:nvSpPr>
+        <p:spPr/>
+        <p:txBody>
+          <a:bodyPr/>
+          <a:lstStyle/>
+          <a:p>
+            <a:r>
+              <a:rPr lang="en-US"/>
+              <a:t>Scatterplots: eNO vs. PM</a:t>
+            </a:r>
+            <a:r>
+              <a:rPr lang="en-US" baseline="-25000"/>
+              <a:t>2.5</a:t>
+            </a:r>
+            <a:endParaRPr lang="en-US"/>
+          </a:p>
+        </p:txBody>
+      </p:sp>
+      <p:pic>
+        <p:nvPicPr>
+          <p:cNvPr id="3" name="Picture 2" descr="maacs9.pdf"/>
+          <p:cNvPicPr>
+            <a:picLocks noChangeAspect="1"/>
+          </p:cNvPicPr>
+          <p:nvPr/>
+        </p:nvPicPr>
+        <p:blipFill>
+          <a:blip r:embed="rId2">
+            <a:extLst>
+              <a:ext uri="{28A0092B-C50C-407E-A947-70E740481C1C}">
+                <a14:useLocalDpi xmlns:a14="http://schemas.microsoft.com/office/drawing/2010/main" val="0"/>
+              </a:ext>
+            </a:extLst>
+          </a:blip>
+          <a:stretch>
+            <a:fillRect/>
+          </a:stretch>
+        </p:blipFill>
+        <p:spPr>
+          <a:xfrm>
+            <a:off x="1028700" y="933690"/>
+            <a:ext cx="7073900" cy="3670300"/>
+          </a:xfrm>
+          <a:prstGeom prst="rect">
+            <a:avLst/>
+          </a:prstGeom>
+        </p:spPr>
+      </p:pic>
+      <p:sp>
+        <p:nvSpPr>
+          <p:cNvPr id="4" name="TextBox 3"/>
+          <p:cNvSpPr txBox="1"/>
+          <p:nvPr/>
+        </p:nvSpPr>
+        <p:spPr>
+          <a:xfrm>
+            <a:off x="77631" y="4675415"/>
+            <a:ext cx="9000681" cy="338554"/>
+          </a:xfrm>
+          <a:prstGeom prst="rect">
+            <a:avLst/>
+          </a:prstGeom>
+          <a:noFill/>
+        </p:spPr>
+        <p:txBody>
+          <a:bodyPr wrap="none" rtlCol="0">
+            <a:spAutoFit/>
+          </a:bodyPr>
+          <a:lstStyle/>
+          <a:p>
+            <a:r>
+              <a:rPr lang="en-US" sz="1600" dirty="0" err="1"/>
+              <a:t>qplot</a:t>
+            </a:r>
+            <a:r>
+              <a:rPr lang="en-US" sz="1600" dirty="0"/>
+              <a:t>(log(pm25), log(</a:t>
+            </a:r>
+            <a:r>
+              <a:rPr lang="en-US" sz="1600" dirty="0" err="1"/>
+              <a:t>eno</a:t>
+            </a:r>
+            <a:r>
+              <a:rPr lang="en-US" sz="1600" dirty="0"/>
+              <a:t>), data = </a:t>
+            </a:r>
+            <a:r>
+              <a:rPr lang="en-US" sz="1600" dirty="0" err="1"/>
+              <a:t>maacs</a:t>
+            </a:r>
+            <a:r>
+              <a:rPr lang="en-US" sz="1600" dirty="0"/>
+              <a:t>, </a:t>
+            </a:r>
+            <a:r>
+              <a:rPr lang="en-US" sz="1600" dirty="0" err="1"/>
+              <a:t>geom</a:t>
+            </a:r>
+            <a:r>
+              <a:rPr lang="en-US" sz="1600" dirty="0"/>
+              <a:t> = c("point", "smooth"), method = "lm", facets = . ~ </a:t>
+            </a:r>
+            <a:r>
+              <a:rPr lang="en-US" sz="1600" dirty="0" err="1"/>
+              <a:t>mopos</a:t>
+            </a:r>
+            <a:r>
+              <a:rPr lang="en-US" sz="1600" dirty="0"/>
+              <a:t>)</a:t>
+            </a:r>
+          </a:p>
+        </p:txBody>
+      </p:sp>
     </p:spTree>
     <p:extLst>
       <p:ext uri="{BB962C8B-B14F-4D97-AF65-F5344CB8AC3E}">
@@ -6074,7 +6190,7 @@
   <p:timing>
     <p:tnLst>
       <p:par>
-        <p:cTn xmlns:p14="http://schemas.microsoft.com/office/powerpoint/2010/main" id="1" dur="indefinite" restart="never" nodeType="tmRoot">
+        <p:cTn id="1" dur="indefinite" restart="never" nodeType="tmRoot">
           <p:childTnLst>
             <p:seq concurrent="1" nextAc="seek">
               <p:cTn id="2" dur="indefinite" nodeType="mainSeq">
@@ -6246,7 +6362,7 @@
   <p:timing>
     <p:tnLst>
       <p:par>
-        <p:cTn xmlns:p14="http://schemas.microsoft.com/office/powerpoint/2010/main" id="1" dur="indefinite" restart="never" nodeType="tmRoot"/>
+        <p:cTn id="1" dur="indefinite" restart="never" nodeType="tmRoot"/>
       </p:par>
     </p:tnLst>
   </p:timing>
@@ -6381,7 +6497,7 @@
   <p:timing>
     <p:tnLst>
       <p:par>
-        <p:cTn xmlns:p14="http://schemas.microsoft.com/office/powerpoint/2010/main" id="1" dur="indefinite" restart="never" nodeType="tmRoot"/>
+        <p:cTn id="1" dur="indefinite" restart="never" nodeType="tmRoot"/>
       </p:par>
     </p:tnLst>
   </p:timing>
@@ -6552,99 +6668,99 @@
           <a:lstStyle/>
           <a:p>
             <a:r>
-              <a:rPr lang="en-US"/>
+              <a:rPr lang="en-US" dirty="0"/>
               <a:t>A </a:t>
             </a:r>
             <a:r>
-              <a:rPr lang="en-US" b="1"/>
+              <a:rPr lang="en-US" b="1" dirty="0"/>
               <a:t>data frame</a:t>
             </a:r>
           </a:p>
           <a:p>
             <a:r>
-              <a:rPr lang="en-US" b="1"/>
+              <a:rPr lang="en-US" b="1" dirty="0"/>
               <a:t>aesthetic</a:t>
             </a:r>
             <a:r>
-              <a:rPr lang="en-US"/>
+              <a:rPr lang="en-US" dirty="0"/>
               <a:t> </a:t>
             </a:r>
             <a:r>
-              <a:rPr lang="en-US" b="1"/>
+              <a:rPr lang="en-US" b="1" dirty="0"/>
               <a:t>mappings</a:t>
             </a:r>
             <a:r>
-              <a:rPr lang="en-US"/>
+              <a:rPr lang="en-US" dirty="0"/>
               <a:t>: how data are mapped to color, size </a:t>
             </a:r>
-            <a:endParaRPr lang="en-US">
+            <a:endParaRPr lang="en-US" dirty="0">
               <a:effectLst/>
             </a:endParaRPr>
           </a:p>
           <a:p>
             <a:r>
-              <a:rPr lang="en-US" b="1"/>
+              <a:rPr lang="en-US" b="1" dirty="0" err="1"/>
               <a:t>geoms</a:t>
             </a:r>
             <a:r>
-              <a:rPr lang="en-US"/>
+              <a:rPr lang="en-US" dirty="0"/>
               <a:t>: geometric objects like points, lines, shapes. </a:t>
             </a:r>
-            <a:endParaRPr lang="en-US">
+            <a:endParaRPr lang="en-US" dirty="0">
               <a:effectLst/>
             </a:endParaRPr>
           </a:p>
           <a:p>
             <a:r>
-              <a:rPr lang="en-US" b="1"/>
+              <a:rPr lang="en-US" b="1" dirty="0"/>
               <a:t>facets</a:t>
             </a:r>
             <a:r>
-              <a:rPr lang="en-US"/>
+              <a:rPr lang="en-US" dirty="0"/>
               <a:t>: for conditional plots. </a:t>
             </a:r>
           </a:p>
           <a:p>
             <a:r>
-              <a:rPr lang="en-US" b="1"/>
+              <a:rPr lang="en-US" b="1" dirty="0"/>
               <a:t>stats</a:t>
             </a:r>
             <a:r>
-              <a:rPr lang="en-US"/>
+              <a:rPr lang="en-US" dirty="0"/>
               <a:t>: statistical transformations like binning, quantiles, smoothing. </a:t>
             </a:r>
-            <a:endParaRPr lang="en-US">
+            <a:endParaRPr lang="en-US" dirty="0">
               <a:effectLst/>
             </a:endParaRPr>
           </a:p>
           <a:p>
             <a:r>
-              <a:rPr lang="en-US" b="1"/>
+              <a:rPr lang="en-US" b="1" dirty="0"/>
               <a:t>scales</a:t>
             </a:r>
             <a:r>
-              <a:rPr lang="en-US"/>
+              <a:rPr lang="en-US" dirty="0"/>
               <a:t>: what scale an aesthetic map uses (example: male = red, female = blue). </a:t>
             </a:r>
-            <a:endParaRPr lang="en-US">
+            <a:endParaRPr lang="en-US" dirty="0">
               <a:effectLst/>
             </a:endParaRPr>
           </a:p>
           <a:p>
             <a:r>
-              <a:rPr lang="en-US" b="1"/>
+              <a:rPr lang="en-US" b="1" dirty="0"/>
               <a:t>coordinate system</a:t>
             </a:r>
             <a:r>
-              <a:rPr lang="en-US"/>
+              <a:rPr lang="en-US" dirty="0"/>
               <a:t> </a:t>
             </a:r>
-            <a:endParaRPr lang="en-US">
+            <a:endParaRPr lang="en-US" dirty="0">
               <a:effectLst/>
             </a:endParaRPr>
           </a:p>
           <a:p>
-            <a:endParaRPr lang="en-US"/>
+            <a:endParaRPr lang="en-US" dirty="0"/>
           </a:p>
         </p:txBody>
       </p:sp>
@@ -6661,7 +6777,7 @@
   <p:timing>
     <p:tnLst>
       <p:par>
-        <p:cTn xmlns:p14="http://schemas.microsoft.com/office/powerpoint/2010/main" id="1" dur="indefinite" restart="never" nodeType="tmRoot"/>
+        <p:cTn id="1" dur="indefinite" restart="never" nodeType="tmRoot"/>
       </p:par>
     </p:tnLst>
   </p:timing>
@@ -6941,11 +7057,74 @@
           <a:lstStyle/>
           <a:p>
             <a:r>
-              <a:rPr lang="en-US" sz="1400">
-                <a:latin typeface="Courier"/>
-                <a:cs typeface="Courier"/>
-              </a:rPr>
-              <a:t>qplot(logpm25, NocturnalSympt, data = maacs, facets = . ~ bmicat, geom = c("point", "smooth"), method = "lm”)</a:t>
+              <a:rPr lang="en-US" sz="1400" dirty="0" err="1">
+                <a:latin typeface="Courier"/>
+                <a:cs typeface="Courier"/>
+              </a:rPr>
+              <a:t>qplot</a:t>
+            </a:r>
+            <a:r>
+              <a:rPr lang="en-US" sz="1400" dirty="0">
+                <a:latin typeface="Courier"/>
+                <a:cs typeface="Courier"/>
+              </a:rPr>
+              <a:t>(logpm25, </a:t>
+            </a:r>
+            <a:r>
+              <a:rPr lang="en-US" sz="1400" dirty="0" err="1">
+                <a:latin typeface="Courier"/>
+                <a:cs typeface="Courier"/>
+              </a:rPr>
+              <a:t>NocturnalSympt</a:t>
+            </a:r>
+            <a:r>
+              <a:rPr lang="en-US" sz="1400" dirty="0">
+                <a:latin typeface="Courier"/>
+                <a:cs typeface="Courier"/>
+              </a:rPr>
+              <a:t>, data = </a:t>
+            </a:r>
+            <a:r>
+              <a:rPr lang="en-US" sz="1400" dirty="0" err="1">
+                <a:latin typeface="Courier"/>
+                <a:cs typeface="Courier"/>
+              </a:rPr>
+              <a:t>maacs</a:t>
+            </a:r>
+            <a:r>
+              <a:rPr lang="en-US" sz="1400" dirty="0">
+                <a:latin typeface="Courier"/>
+                <a:cs typeface="Courier"/>
+              </a:rPr>
+              <a:t>, facets = . ~ </a:t>
+            </a:r>
+            <a:r>
+              <a:rPr lang="en-US" sz="1400" dirty="0" err="1">
+                <a:latin typeface="Courier"/>
+                <a:cs typeface="Courier"/>
+              </a:rPr>
+              <a:t>bmicat</a:t>
+            </a:r>
+            <a:r>
+              <a:rPr lang="en-US" sz="1400" dirty="0">
+                <a:latin typeface="Courier"/>
+                <a:cs typeface="Courier"/>
+              </a:rPr>
+              <a:t>, </a:t>
+            </a:r>
+            <a:r>
+              <a:rPr lang="en-US" sz="1400" dirty="0" err="1">
+                <a:latin typeface="Courier"/>
+                <a:cs typeface="Courier"/>
+              </a:rPr>
+              <a:t>geom</a:t>
+            </a:r>
+            <a:r>
+              <a:rPr lang="en-US" sz="1400" dirty="0">
+                <a:latin typeface="Courier"/>
+                <a:cs typeface="Courier"/>
+              </a:rPr>
+              <a:t> = c("point", "smooth"), method = "lm”)</a:t>
             </a:r>
           </a:p>
         </p:txBody>
@@ -7055,100 +7234,195 @@
           <a:lstStyle/>
           <a:p>
             <a:r>
-              <a:rPr lang="en-US" sz="1600">
-                <a:latin typeface="Courier"/>
-                <a:cs typeface="Courier"/>
-              </a:rPr>
-              <a:t>&gt; head(maacs)</a:t>
-            </a:r>
-          </a:p>
-          <a:p>
-            <a:r>
-              <a:rPr lang="en-US" sz="1600">
-                <a:latin typeface="Courier"/>
-                <a:cs typeface="Courier"/>
-              </a:rPr>
-              <a:t>    logpm25        bmicat NocturnalSympt</a:t>
-            </a:r>
-          </a:p>
-          <a:p>
-            <a:r>
-              <a:rPr lang="en-US" sz="1600">
-                <a:latin typeface="Courier"/>
-                <a:cs typeface="Courier"/>
-              </a:rPr>
-              <a:t>2 1.5361795 normal weight              1</a:t>
-            </a:r>
-          </a:p>
-          <a:p>
-            <a:r>
-              <a:rPr lang="en-US" sz="1600">
-                <a:latin typeface="Courier"/>
-                <a:cs typeface="Courier"/>
-              </a:rPr>
-              <a:t>3 1.5905409 normal weight              0</a:t>
-            </a:r>
-          </a:p>
-          <a:p>
-            <a:r>
-              <a:rPr lang="en-US" sz="1600">
-                <a:latin typeface="Courier"/>
-                <a:cs typeface="Courier"/>
-              </a:rPr>
-              <a:t>4 1.5217786 normal weight              0</a:t>
-            </a:r>
-          </a:p>
-          <a:p>
-            <a:r>
-              <a:rPr lang="en-US" sz="1600">
-                <a:latin typeface="Courier"/>
-                <a:cs typeface="Courier"/>
-              </a:rPr>
-              <a:t>5 1.4323277 normal weight              0</a:t>
-            </a:r>
-          </a:p>
-          <a:p>
-            <a:r>
-              <a:rPr lang="en-US" sz="1600">
-                <a:latin typeface="Courier"/>
-                <a:cs typeface="Courier"/>
-              </a:rPr>
-              <a:t>6 1.2762320    overweight              8</a:t>
-            </a:r>
-          </a:p>
-          <a:p>
-            <a:r>
-              <a:rPr lang="en-US" sz="1600">
-                <a:latin typeface="Courier"/>
-                <a:cs typeface="Courier"/>
-              </a:rPr>
-              <a:t>8 0.7139103    overweight              0</a:t>
-            </a:r>
-          </a:p>
-          <a:p>
-            <a:endParaRPr lang="en-US" sz="1600">
+              <a:rPr lang="en-US" sz="1600" dirty="0">
+                <a:latin typeface="Courier"/>
+                <a:cs typeface="Courier"/>
+              </a:rPr>
+              <a:t>&gt; head(</a:t>
+            </a:r>
+            <a:r>
+              <a:rPr lang="en-US" sz="1600" dirty="0" err="1">
+                <a:latin typeface="Courier"/>
+                <a:cs typeface="Courier"/>
+              </a:rPr>
+              <a:t>maacs</a:t>
+            </a:r>
+            <a:r>
+              <a:rPr lang="en-US" sz="1600" dirty="0">
+                <a:latin typeface="Courier"/>
+                <a:cs typeface="Courier"/>
+              </a:rPr>
+              <a:t>)</a:t>
+            </a:r>
+          </a:p>
+          <a:p>
+            <a:r>
+              <a:rPr lang="en-US" sz="1600" dirty="0">
+                <a:latin typeface="Courier"/>
+                <a:cs typeface="Courier"/>
+              </a:rPr>
+              <a:t>    logpm25        </a:t>
+            </a:r>
+            <a:r>
+              <a:rPr lang="en-US" sz="1600" dirty="0" err="1">
+                <a:latin typeface="Courier"/>
+                <a:cs typeface="Courier"/>
+              </a:rPr>
+              <a:t>bmicat</a:t>
+            </a:r>
+            <a:r>
+              <a:rPr lang="en-US" sz="1600" dirty="0">
+                <a:latin typeface="Courier"/>
+                <a:cs typeface="Courier"/>
+              </a:rPr>
+              <a:t> </a:t>
+            </a:r>
+            <a:r>
+              <a:rPr lang="en-US" sz="1600" dirty="0" err="1">
+                <a:latin typeface="Courier"/>
+                <a:cs typeface="Courier"/>
+              </a:rPr>
+              <a:t>NocturnalSympt</a:t>
+            </a:r>
+            <a:endParaRPr lang="en-US" sz="1600" dirty="0">
               <a:latin typeface="Courier"/>
               <a:cs typeface="Courier"/>
             </a:endParaRPr>
           </a:p>
           <a:p>
             <a:r>
-              <a:rPr lang="en-US" sz="1600">
-                <a:latin typeface="Courier"/>
-                <a:cs typeface="Courier"/>
-              </a:rPr>
-              <a:t>&gt; g &lt;- ggplot(maacs, aes(logpm25, NocturnalSympt))</a:t>
-            </a:r>
-          </a:p>
-          <a:p>
-            <a:endParaRPr lang="en-US" sz="1600">
+              <a:rPr lang="en-US" sz="1600" dirty="0">
+                <a:latin typeface="Courier"/>
+                <a:cs typeface="Courier"/>
+              </a:rPr>
+              <a:t>2 1.5361795 normal weight              1</a:t>
+            </a:r>
+          </a:p>
+          <a:p>
+            <a:r>
+              <a:rPr lang="en-US" sz="1600" dirty="0">
+                <a:latin typeface="Courier"/>
+                <a:cs typeface="Courier"/>
+              </a:rPr>
+              <a:t>3 1.5905409 normal weight              0</a:t>
+            </a:r>
+          </a:p>
+          <a:p>
+            <a:r>
+              <a:rPr lang="en-US" sz="1600" dirty="0">
+                <a:latin typeface="Courier"/>
+                <a:cs typeface="Courier"/>
+              </a:rPr>
+              <a:t>4 1.5217786 normal weight              0</a:t>
+            </a:r>
+          </a:p>
+          <a:p>
+            <a:r>
+              <a:rPr lang="en-US" sz="1600" dirty="0">
+                <a:latin typeface="Courier"/>
+                <a:cs typeface="Courier"/>
+              </a:rPr>
+              <a:t>5 1.4323277 normal weight              0</a:t>
+            </a:r>
+          </a:p>
+          <a:p>
+            <a:r>
+              <a:rPr lang="en-US" sz="1600" dirty="0">
+                <a:latin typeface="Courier"/>
+                <a:cs typeface="Courier"/>
+              </a:rPr>
+              <a:t>6 1.2762320    overweight              8</a:t>
+            </a:r>
+          </a:p>
+          <a:p>
+            <a:r>
+              <a:rPr lang="en-US" sz="1600" dirty="0">
+                <a:latin typeface="Courier"/>
+                <a:cs typeface="Courier"/>
+              </a:rPr>
+              <a:t>8 0.7139103    overweight              0</a:t>
+            </a:r>
+          </a:p>
+          <a:p>
+            <a:endParaRPr lang="en-US" sz="1600" dirty="0">
               <a:latin typeface="Courier"/>
               <a:cs typeface="Courier"/>
             </a:endParaRPr>
           </a:p>
           <a:p>
             <a:r>
-              <a:rPr lang="en-US" sz="1600">
+              <a:rPr lang="en-US" sz="1600" dirty="0">
+                <a:latin typeface="Courier"/>
+                <a:cs typeface="Courier"/>
+              </a:rPr>
+              <a:t>&gt; g &lt;- </a:t>
+            </a:r>
+            <a:r>
+              <a:rPr lang="en-US" sz="1600" dirty="0" err="1">
+                <a:latin typeface="Courier"/>
+                <a:cs typeface="Courier"/>
+              </a:rPr>
+              <a:t>ggplot</a:t>
+            </a:r>
+            <a:r>
+              <a:rPr lang="en-US" sz="1600" dirty="0">
+                <a:latin typeface="Courier"/>
+                <a:cs typeface="Courier"/>
+              </a:rPr>
+              <a:t>(</a:t>
+            </a:r>
+            <a:r>
+              <a:rPr lang="en-US" sz="1600" dirty="0" err="1">
+                <a:latin typeface="Courier"/>
+                <a:cs typeface="Courier"/>
+              </a:rPr>
+              <a:t>maacs</a:t>
+            </a:r>
+            <a:r>
+              <a:rPr lang="en-US" sz="1600" dirty="0">
+                <a:latin typeface="Courier"/>
+                <a:cs typeface="Courier"/>
+              </a:rPr>
+              <a:t>, </a:t>
+            </a:r>
+            <a:r>
+              <a:rPr lang="en-US" sz="1600" dirty="0" err="1">
+                <a:latin typeface="Courier"/>
+                <a:cs typeface="Courier"/>
+              </a:rPr>
+              <a:t>aes</a:t>
+            </a:r>
+            <a:r>
+              <a:rPr lang="en-US" sz="1600" dirty="0">
+                <a:latin typeface="Courier"/>
+                <a:cs typeface="Courier"/>
+              </a:rPr>
+              <a:t>(logpm25, </a:t>
+            </a:r>
+            <a:r>
+              <a:rPr lang="en-US" sz="1600" dirty="0" err="1">
+                <a:latin typeface="Courier"/>
+                <a:cs typeface="Courier"/>
+              </a:rPr>
+              <a:t>NocturnalSympt</a:t>
+            </a:r>
+            <a:r>
+              <a:rPr lang="en-US" sz="1600" dirty="0">
+                <a:latin typeface="Courier"/>
+                <a:cs typeface="Courier"/>
+              </a:rPr>
+              <a:t>))</a:t>
+            </a:r>
+          </a:p>
+          <a:p>
+            <a:endParaRPr lang="en-US" sz="1600" dirty="0">
+              <a:latin typeface="Courier"/>
+              <a:cs typeface="Courier"/>
+            </a:endParaRPr>
+          </a:p>
+          <a:p>
+            <a:r>
+              <a:rPr lang="en-US" sz="1600" dirty="0">
                 <a:latin typeface="Courier"/>
                 <a:cs typeface="Courier"/>
               </a:rPr>
@@ -7157,33 +7431,86 @@
           </a:p>
           <a:p>
             <a:r>
-              <a:rPr lang="en-US" sz="1600">
-                <a:latin typeface="Courier"/>
-                <a:cs typeface="Courier"/>
-              </a:rPr>
-              <a:t>data: logpm25, bmicat, NocturnalSympt [554x3]</a:t>
-            </a:r>
-          </a:p>
-          <a:p>
-            <a:r>
-              <a:rPr lang="en-US" sz="1600">
-                <a:latin typeface="Courier"/>
-                <a:cs typeface="Courier"/>
-              </a:rPr>
-              <a:t>mapping:  x = logpm25, y = NocturnalSympt</a:t>
-            </a:r>
-          </a:p>
-          <a:p>
-            <a:r>
-              <a:rPr lang="en-US" sz="1600">
-                <a:latin typeface="Courier"/>
-                <a:cs typeface="Courier"/>
-              </a:rPr>
-              <a:t>faceting: facet_null() </a:t>
-            </a:r>
-          </a:p>
-          <a:p>
-            <a:endParaRPr lang="en-US" sz="1600">
+              <a:rPr lang="en-US" sz="1600" dirty="0">
+                <a:latin typeface="Courier"/>
+                <a:cs typeface="Courier"/>
+              </a:rPr>
+              <a:t>data: logpm25, </a:t>
+            </a:r>
+            <a:r>
+              <a:rPr lang="en-US" sz="1600" dirty="0" err="1">
+                <a:latin typeface="Courier"/>
+                <a:cs typeface="Courier"/>
+              </a:rPr>
+              <a:t>bmicat</a:t>
+            </a:r>
+            <a:r>
+              <a:rPr lang="en-US" sz="1600" dirty="0">
+                <a:latin typeface="Courier"/>
+                <a:cs typeface="Courier"/>
+              </a:rPr>
+              <a:t>, </a:t>
+            </a:r>
+            <a:r>
+              <a:rPr lang="en-US" sz="1600" dirty="0" err="1">
+                <a:latin typeface="Courier"/>
+                <a:cs typeface="Courier"/>
+              </a:rPr>
+              <a:t>NocturnalSympt</a:t>
+            </a:r>
+            <a:r>
+              <a:rPr lang="en-US" sz="1600" dirty="0">
+                <a:latin typeface="Courier"/>
+                <a:cs typeface="Courier"/>
+              </a:rPr>
+              <a:t> [554x3]</a:t>
+            </a:r>
+          </a:p>
+          <a:p>
+            <a:r>
+              <a:rPr lang="en-US" sz="1600" dirty="0">
+                <a:latin typeface="Courier"/>
+                <a:cs typeface="Courier"/>
+              </a:rPr>
+              <a:t>mapping:  x = logpm25, y = </a:t>
+            </a:r>
+            <a:r>
+              <a:rPr lang="en-US" sz="1600" dirty="0" err="1">
+                <a:latin typeface="Courier"/>
+                <a:cs typeface="Courier"/>
+              </a:rPr>
+              <a:t>NocturnalSympt</a:t>
+            </a:r>
+            <a:endParaRPr lang="en-US" sz="1600" dirty="0">
+              <a:latin typeface="Courier"/>
+              <a:cs typeface="Courier"/>
+            </a:endParaRPr>
+          </a:p>
+          <a:p>
+            <a:r>
+              <a:rPr lang="en-US" sz="1600" dirty="0">
+                <a:latin typeface="Courier"/>
+                <a:cs typeface="Courier"/>
+              </a:rPr>
+              <a:t>faceting: </a:t>
+            </a:r>
+            <a:r>
+              <a:rPr lang="en-US" sz="1600" dirty="0" err="1">
+                <a:latin typeface="Courier"/>
+                <a:cs typeface="Courier"/>
+              </a:rPr>
+              <a:t>facet_null</a:t>
+            </a:r>
+            <a:r>
+              <a:rPr lang="en-US" sz="1600" dirty="0">
+                <a:latin typeface="Courier"/>
+                <a:cs typeface="Courier"/>
+              </a:rPr>
+              <a:t>() </a:t>
+            </a:r>
+          </a:p>
+          <a:p>
+            <a:endParaRPr lang="en-US" sz="1600" dirty="0">
               <a:latin typeface="Courier"/>
               <a:cs typeface="Courier"/>
             </a:endParaRPr>
@@ -8063,7 +8390,7 @@
           <a:lstStyle/>
           <a:p>
             <a:r>
-              <a:rPr lang="en-US"/>
+              <a:rPr lang="en-US" dirty="0"/>
               <a:t>Adding More Layers: Smooth</a:t>
             </a:r>
           </a:p>
@@ -8152,11 +8479,39 @@
           <a:lstStyle/>
           <a:p>
             <a:r>
-              <a:rPr lang="en-US" sz="1200">
-                <a:latin typeface="Courier"/>
-                <a:cs typeface="Courier"/>
-              </a:rPr>
-              <a:t>g + geom_point() + geom_smooth(method = "lm”)</a:t>
+              <a:rPr lang="en-US" sz="1200" dirty="0">
+                <a:latin typeface="Courier"/>
+                <a:cs typeface="Courier"/>
+              </a:rPr>
+              <a:t>g + </a:t>
+            </a:r>
+            <a:r>
+              <a:rPr lang="en-US" sz="1200" dirty="0" err="1">
+                <a:latin typeface="Courier"/>
+                <a:cs typeface="Courier"/>
+              </a:rPr>
+              <a:t>geom_point</a:t>
+            </a:r>
+            <a:r>
+              <a:rPr lang="en-US" sz="1200" dirty="0">
+                <a:latin typeface="Courier"/>
+                <a:cs typeface="Courier"/>
+              </a:rPr>
+              <a:t>() + </a:t>
+            </a:r>
+            <a:r>
+              <a:rPr lang="en-US" sz="1200" dirty="0" err="1">
+                <a:latin typeface="Courier"/>
+                <a:cs typeface="Courier"/>
+              </a:rPr>
+              <a:t>geom_smooth</a:t>
+            </a:r>
+            <a:r>
+              <a:rPr lang="en-US" sz="1200" dirty="0">
+                <a:latin typeface="Courier"/>
+                <a:cs typeface="Courier"/>
+              </a:rPr>
+              <a:t>(method = "lm”)</a:t>
             </a:r>
           </a:p>
         </p:txBody>
@@ -8184,11 +8539,39 @@
           <a:lstStyle/>
           <a:p>
             <a:r>
-              <a:rPr lang="en-US" sz="1200">
-                <a:latin typeface="Courier"/>
-                <a:cs typeface="Courier"/>
-              </a:rPr>
-              <a:t>g + geom_point() + geom_smooth()</a:t>
+              <a:rPr lang="en-US" sz="1200" dirty="0">
+                <a:latin typeface="Courier"/>
+                <a:cs typeface="Courier"/>
+              </a:rPr>
+              <a:t>g + </a:t>
+            </a:r>
+            <a:r>
+              <a:rPr lang="en-US" sz="1200" dirty="0" err="1">
+                <a:latin typeface="Courier"/>
+                <a:cs typeface="Courier"/>
+              </a:rPr>
+              <a:t>geom_point</a:t>
+            </a:r>
+            <a:r>
+              <a:rPr lang="en-US" sz="1200" dirty="0">
+                <a:latin typeface="Courier"/>
+                <a:cs typeface="Courier"/>
+              </a:rPr>
+              <a:t>() + </a:t>
+            </a:r>
+            <a:r>
+              <a:rPr lang="en-US" sz="1200" dirty="0" err="1">
+                <a:latin typeface="Courier"/>
+                <a:cs typeface="Courier"/>
+              </a:rPr>
+              <a:t>geom_smooth</a:t>
+            </a:r>
+            <a:r>
+              <a:rPr lang="en-US" sz="1200" dirty="0">
+                <a:latin typeface="Courier"/>
+                <a:cs typeface="Courier"/>
+              </a:rPr>
+              <a:t>()</a:t>
             </a:r>
           </a:p>
         </p:txBody>
@@ -8297,11 +8680,67 @@
           <a:lstStyle/>
           <a:p>
             <a:r>
-              <a:rPr lang="en-US" sz="1400">
-                <a:latin typeface="Courier"/>
-                <a:cs typeface="Courier"/>
-              </a:rPr>
-              <a:t>g + geom_point() + facet_grid(. ~ bmicat) + geom_smooth(method = "lm")</a:t>
+              <a:rPr lang="en-US" sz="1400" dirty="0">
+                <a:latin typeface="Courier"/>
+                <a:cs typeface="Courier"/>
+              </a:rPr>
+              <a:t>g + </a:t>
+            </a:r>
+            <a:r>
+              <a:rPr lang="en-US" sz="1400" dirty="0" err="1">
+                <a:latin typeface="Courier"/>
+                <a:cs typeface="Courier"/>
+              </a:rPr>
+              <a:t>geom_point</a:t>
+            </a:r>
+            <a:r>
+              <a:rPr lang="en-US" sz="1400" dirty="0">
+                <a:latin typeface="Courier"/>
+                <a:cs typeface="Courier"/>
+              </a:rPr>
+              <a:t>() + </a:t>
+            </a:r>
+            <a:r>
+              <a:rPr lang="en-US" sz="1400" dirty="0" err="1">
+                <a:latin typeface="Courier"/>
+                <a:cs typeface="Courier"/>
+              </a:rPr>
+              <a:t>facet_grid</a:t>
+            </a:r>
+            <a:r>
+              <a:rPr lang="en-US" sz="1400" dirty="0">
+                <a:latin typeface="Courier"/>
+                <a:cs typeface="Courier"/>
+              </a:rPr>
+              <a:t>(. ~ </a:t>
+            </a:r>
+            <a:r>
+              <a:rPr lang="en-US" sz="1400" dirty="0" err="1">
+                <a:latin typeface="Courier"/>
+                <a:cs typeface="Courier"/>
+              </a:rPr>
+              <a:t>bmicat</a:t>
+            </a:r>
+            <a:r>
+              <a:rPr lang="en-US" sz="1400" dirty="0">
+                <a:latin typeface="Courier"/>
+                <a:cs typeface="Courier"/>
+              </a:rPr>
+              <a:t>) + </a:t>
+            </a:r>
+            <a:r>
+              <a:rPr lang="en-US" sz="1400" dirty="0" err="1">
+                <a:latin typeface="Courier"/>
+                <a:cs typeface="Courier"/>
+              </a:rPr>
+              <a:t>geom_smooth</a:t>
+            </a:r>
+            <a:r>
+              <a:rPr lang="en-US" sz="1400" dirty="0">
+                <a:latin typeface="Courier"/>
+                <a:cs typeface="Courier"/>
+              </a:rPr>
+              <a:t>(method = "lm")</a:t>
             </a:r>
           </a:p>
         </p:txBody>
@@ -8578,7 +9017,7 @@
           <a:lstStyle/>
           <a:p>
             <a:r>
-              <a:rPr lang="en-US"/>
+              <a:rPr lang="en-US" dirty="0"/>
               <a:t>Annotation</a:t>
             </a:r>
           </a:p>
@@ -8602,57 +9041,105 @@
           <a:lstStyle/>
           <a:p>
             <a:r>
-              <a:rPr lang="en-US"/>
-              <a:t>Labels: xlab(), ylab(), labs(), ggtitle()</a:t>
-            </a:r>
-          </a:p>
-          <a:p>
-            <a:r>
-              <a:rPr lang="en-US"/>
-              <a:t>Each of the “geom” functions has options to modify </a:t>
-            </a:r>
-          </a:p>
-          <a:p>
-            <a:r>
-              <a:rPr lang="en-US"/>
+              <a:rPr lang="en-US" dirty="0"/>
+              <a:t>Labels: </a:t>
+            </a:r>
+            <a:r>
+              <a:rPr lang="en-US" dirty="0" err="1"/>
+              <a:t>xlab</a:t>
+            </a:r>
+            <a:r>
+              <a:rPr lang="en-US" dirty="0"/>
+              <a:t>(), </a:t>
+            </a:r>
+            <a:r>
+              <a:rPr lang="en-US" dirty="0" err="1"/>
+              <a:t>ylab</a:t>
+            </a:r>
+            <a:r>
+              <a:rPr lang="en-US" dirty="0"/>
+              <a:t>(), labs(), </a:t>
+            </a:r>
+            <a:r>
+              <a:rPr lang="en-US" dirty="0" err="1"/>
+              <a:t>ggtitle</a:t>
+            </a:r>
+            <a:r>
+              <a:rPr lang="en-US" dirty="0"/>
+              <a:t>()</a:t>
+            </a:r>
+          </a:p>
+          <a:p>
+            <a:r>
+              <a:rPr lang="en-US" dirty="0"/>
+              <a:t>Each of the “</a:t>
+            </a:r>
+            <a:r>
+              <a:rPr lang="en-US" dirty="0" err="1"/>
+              <a:t>geom</a:t>
+            </a:r>
+            <a:r>
+              <a:rPr lang="en-US" dirty="0"/>
+              <a:t>” functions has options to modify </a:t>
+            </a:r>
+          </a:p>
+          <a:p>
+            <a:r>
+              <a:rPr lang="en-US" dirty="0"/>
               <a:t>For things that only make sense globally, use theme() </a:t>
             </a:r>
           </a:p>
           <a:p>
             <a:pPr lvl="1"/>
             <a:r>
-              <a:rPr lang="en-US"/>
-              <a:t>Example: theme(legend.position = "none") </a:t>
-            </a:r>
-            <a:endParaRPr lang="en-US">
+              <a:rPr lang="en-US" dirty="0"/>
+              <a:t>Example: theme(</a:t>
+            </a:r>
+            <a:r>
+              <a:rPr lang="en-US" dirty="0" err="1"/>
+              <a:t>legend.position</a:t>
+            </a:r>
+            <a:r>
+              <a:rPr lang="en-US" dirty="0"/>
+              <a:t> = "none") </a:t>
+            </a:r>
+            <a:endParaRPr lang="en-US" dirty="0">
               <a:effectLst/>
             </a:endParaRPr>
           </a:p>
           <a:p>
             <a:r>
-              <a:rPr lang="en-US"/>
+              <a:rPr lang="en-US" dirty="0"/>
               <a:t>Two standard appearance themes are included</a:t>
             </a:r>
           </a:p>
           <a:p>
             <a:pPr lvl="1"/>
             <a:r>
-              <a:rPr lang="en-US"/>
-              <a:t>theme_gray(): The default theme (gray background)</a:t>
+              <a:rPr lang="en-US" dirty="0" err="1"/>
+              <a:t>theme_gray</a:t>
+            </a:r>
+            <a:r>
+              <a:rPr lang="en-US" dirty="0"/>
+              <a:t>(): The default theme (gray background)</a:t>
             </a:r>
           </a:p>
           <a:p>
             <a:pPr lvl="1"/>
             <a:r>
-              <a:rPr lang="en-US"/>
-              <a:t>theme_bw(): More stark/plain </a:t>
-            </a:r>
-            <a:endParaRPr lang="en-US">
+              <a:rPr lang="en-US" dirty="0" err="1"/>
+              <a:t>theme_bw</a:t>
+            </a:r>
+            <a:r>
+              <a:rPr lang="en-US" dirty="0"/>
+              <a:t>(): More stark/plain </a:t>
+            </a:r>
+            <a:endParaRPr lang="en-US" dirty="0">
               <a:effectLst/>
             </a:endParaRPr>
           </a:p>
           <a:p>
-            <a:endParaRPr lang="en-US"/>
+            <a:endParaRPr lang="en-US" dirty="0"/>
           </a:p>
         </p:txBody>
       </p:sp>
@@ -8731,11 +9218,39 @@
           <a:lstStyle/>
           <a:p>
             <a:r>
-              <a:rPr lang="en-US" sz="1400">
-                <a:latin typeface="Courier"/>
-                <a:cs typeface="Courier"/>
-              </a:rPr>
-              <a:t>g + geom_point(color = "steelblue”, size = 4, alpha = 1/2)</a:t>
+              <a:rPr lang="en-US" sz="1400" dirty="0">
+                <a:latin typeface="Courier"/>
+                <a:cs typeface="Courier"/>
+              </a:rPr>
+              <a:t>g + </a:t>
+            </a:r>
+            <a:r>
+              <a:rPr lang="en-US" sz="1400" dirty="0" err="1">
+                <a:latin typeface="Courier"/>
+                <a:cs typeface="Courier"/>
+              </a:rPr>
+              <a:t>geom_point</a:t>
+            </a:r>
+            <a:r>
+              <a:rPr lang="en-US" sz="1400" dirty="0">
+                <a:latin typeface="Courier"/>
+                <a:cs typeface="Courier"/>
+              </a:rPr>
+              <a:t>(color = "</a:t>
+            </a:r>
+            <a:r>
+              <a:rPr lang="en-US" sz="1400" dirty="0" err="1">
+                <a:latin typeface="Courier"/>
+                <a:cs typeface="Courier"/>
+              </a:rPr>
+              <a:t>steelblue</a:t>
+            </a:r>
+            <a:r>
+              <a:rPr lang="en-US" sz="1400" dirty="0">
+                <a:latin typeface="Courier"/>
+                <a:cs typeface="Courier"/>
+              </a:rPr>
+              <a:t>”, size = 4, alpha = 1/2)</a:t>
             </a:r>
           </a:p>
         </p:txBody>
@@ -9089,11 +9604,53 @@
           <a:lstStyle/>
           <a:p>
             <a:r>
-              <a:rPr lang="en-US" sz="1200">
-                <a:latin typeface="Courier"/>
-                <a:cs typeface="Courier"/>
-              </a:rPr>
-              <a:t>g + geom_point(aes(color = bmicat)) + labs(title = "MAACS Cohort") + labs(x = expression("log " * PM[2.5]), y = "Nocturnal Symptoms")</a:t>
+              <a:rPr lang="en-US" sz="1200" dirty="0">
+                <a:latin typeface="Courier"/>
+                <a:cs typeface="Courier"/>
+              </a:rPr>
+              <a:t>g + </a:t>
+            </a:r>
+            <a:r>
+              <a:rPr lang="en-US" sz="1200" dirty="0" err="1">
+                <a:latin typeface="Courier"/>
+                <a:cs typeface="Courier"/>
+              </a:rPr>
+              <a:t>geom_point</a:t>
+            </a:r>
+            <a:r>
+              <a:rPr lang="en-US" sz="1200" dirty="0">
+                <a:latin typeface="Courier"/>
+                <a:cs typeface="Courier"/>
+              </a:rPr>
+              <a:t>(</a:t>
+            </a:r>
+            <a:r>
+              <a:rPr lang="en-US" sz="1200" dirty="0" err="1">
+                <a:latin typeface="Courier"/>
+                <a:cs typeface="Courier"/>
+              </a:rPr>
+              <a:t>aes</a:t>
+            </a:r>
+            <a:r>
+              <a:rPr lang="en-US" sz="1200" dirty="0">
+                <a:latin typeface="Courier"/>
+                <a:cs typeface="Courier"/>
+              </a:rPr>
+              <a:t>(color = </a:t>
+            </a:r>
+            <a:r>
+              <a:rPr lang="en-US" sz="1200" dirty="0" err="1">
+                <a:latin typeface="Courier"/>
+                <a:cs typeface="Courier"/>
+              </a:rPr>
+              <a:t>bmicat</a:t>
+            </a:r>
+            <a:r>
+              <a:rPr lang="en-US" sz="1200" dirty="0">
+                <a:latin typeface="Courier"/>
+                <a:cs typeface="Courier"/>
+              </a:rPr>
+              <a:t>)) + labs(title = "MAACS Cohort") + labs(x = expression("log " * PM[2.5]), y = "Nocturnal Symptoms")</a:t>
             </a:r>
           </a:p>
         </p:txBody>
@@ -9279,11 +9836,81 @@
           <a:lstStyle/>
           <a:p>
             <a:r>
-              <a:rPr lang="en-US" sz="1400">
-                <a:latin typeface="Courier"/>
-                <a:cs typeface="Courier"/>
-              </a:rPr>
-              <a:t>g + geom_point(aes(color = bmicat), size = 2, alpha = 1/2) + geom_smooth(size = 4, linetype = 3, method = "lm", se = FALSE)</a:t>
+              <a:rPr lang="en-US" sz="1400" dirty="0">
+                <a:latin typeface="Courier"/>
+                <a:cs typeface="Courier"/>
+              </a:rPr>
+              <a:t>g + </a:t>
+            </a:r>
+            <a:r>
+              <a:rPr lang="en-US" sz="1400" dirty="0" err="1">
+                <a:latin typeface="Courier"/>
+                <a:cs typeface="Courier"/>
+              </a:rPr>
+              <a:t>geom_point</a:t>
+            </a:r>
+            <a:r>
+              <a:rPr lang="en-US" sz="1400" dirty="0">
+                <a:latin typeface="Courier"/>
+                <a:cs typeface="Courier"/>
+              </a:rPr>
+              <a:t>(</a:t>
+            </a:r>
+            <a:r>
+              <a:rPr lang="en-US" sz="1400" dirty="0" err="1">
+                <a:latin typeface="Courier"/>
+                <a:cs typeface="Courier"/>
+              </a:rPr>
+              <a:t>aes</a:t>
+            </a:r>
+            <a:r>
+              <a:rPr lang="en-US" sz="1400" dirty="0">
+                <a:latin typeface="Courier"/>
+                <a:cs typeface="Courier"/>
+              </a:rPr>
+              <a:t>(color = </a:t>
+            </a:r>
+            <a:r>
+              <a:rPr lang="en-US" sz="1400" dirty="0" err="1">
+                <a:latin typeface="Courier"/>
+                <a:cs typeface="Courier"/>
+              </a:rPr>
+              <a:t>bmicat</a:t>
+            </a:r>
+            <a:r>
+              <a:rPr lang="en-US" sz="1400" dirty="0">
+                <a:latin typeface="Courier"/>
+                <a:cs typeface="Courier"/>
+              </a:rPr>
+              <a:t>), size = 2, alpha = 1/2) + </a:t>
+            </a:r>
+            <a:r>
+              <a:rPr lang="en-US" sz="1400" dirty="0" err="1">
+                <a:latin typeface="Courier"/>
+                <a:cs typeface="Courier"/>
+              </a:rPr>
+              <a:t>geom_smooth</a:t>
+            </a:r>
+            <a:r>
+              <a:rPr lang="en-US" sz="1400" dirty="0">
+                <a:latin typeface="Courier"/>
+                <a:cs typeface="Courier"/>
+              </a:rPr>
+              <a:t>(size = 4, </a:t>
+            </a:r>
+            <a:r>
+              <a:rPr lang="en-US" sz="1400" dirty="0" err="1">
+                <a:latin typeface="Courier"/>
+                <a:cs typeface="Courier"/>
+              </a:rPr>
+              <a:t>linetype</a:t>
+            </a:r>
+            <a:r>
+              <a:rPr lang="en-US" sz="1400" dirty="0">
+                <a:latin typeface="Courier"/>
+                <a:cs typeface="Courier"/>
+              </a:rPr>
+              <a:t> = 3, method = "lm", se = FALSE)</a:t>
             </a:r>
           </a:p>
         </p:txBody>
@@ -10123,31 +10750,39 @@
               <a:buNone/>
             </a:pPr>
             <a:r>
-              <a:rPr lang="en-US"/>
+              <a:rPr lang="en-US" dirty="0"/>
               <a:t>“In brief, the grammar tells us that a statistical graphic is a </a:t>
             </a:r>
             <a:r>
-              <a:rPr lang="en-US" b="1"/>
+              <a:rPr lang="en-US" b="1" dirty="0"/>
               <a:t>mapping</a:t>
             </a:r>
             <a:r>
-              <a:rPr lang="en-US"/>
+              <a:rPr lang="en-US" dirty="0"/>
               <a:t> from data to </a:t>
             </a:r>
             <a:r>
-              <a:rPr lang="en-US" b="1"/>
+              <a:rPr lang="en-US" b="1" dirty="0"/>
               <a:t>aesthetic</a:t>
             </a:r>
             <a:r>
-              <a:rPr lang="en-US"/>
-              <a:t> attributes (colour, shape, size) of </a:t>
-            </a:r>
-            <a:r>
-              <a:rPr lang="en-US" b="1"/>
+              <a:rPr lang="en-US" dirty="0"/>
+              <a:t> attributes (</a:t>
+            </a:r>
+            <a:r>
+              <a:rPr lang="en-US" dirty="0" err="1"/>
+              <a:t>colour</a:t>
+            </a:r>
+            <a:r>
+              <a:rPr lang="en-US" dirty="0"/>
+              <a:t>, shape, size) of </a:t>
+            </a:r>
+            <a:r>
+              <a:rPr lang="en-US" b="1" dirty="0"/>
               <a:t>geometric</a:t>
             </a:r>
             <a:r>
-              <a:rPr lang="en-US"/>
+              <a:rPr lang="en-US" dirty="0"/>
               <a:t> objects (points, lines, bars). The plot may also contain statistical transformations of the data and is drawn on a specific coordinate system”</a:t>
             </a:r>
           </a:p>
@@ -10156,20 +10791,20 @@
               <a:buNone/>
             </a:pPr>
             <a:r>
-              <a:rPr lang="en-US">
+              <a:rPr lang="en-US" dirty="0">
                 <a:effectLst/>
               </a:rPr>
               <a:t>from </a:t>
             </a:r>
             <a:r>
-              <a:rPr lang="en-US" i="1"/>
+              <a:rPr lang="en-US" i="1" dirty="0"/>
               <a:t>ggplot2</a:t>
             </a:r>
             <a:r>
-              <a:rPr lang="en-US"/>
+              <a:rPr lang="en-US" dirty="0"/>
               <a:t> book</a:t>
             </a:r>
-            <a:endParaRPr lang="en-US">
+            <a:endParaRPr lang="en-US" dirty="0">
               <a:effectLst/>
             </a:endParaRPr>
           </a:p>
@@ -10380,55 +11015,125 @@
           <a:lstStyle/>
           <a:p>
             <a:r>
-              <a:rPr lang="en-US" sz="1400">
-                <a:latin typeface="Courier"/>
-                <a:cs typeface="Courier"/>
-              </a:rPr>
-              <a:t>## Calculate the deciles of the data</a:t>
-            </a:r>
-          </a:p>
-          <a:p>
-            <a:r>
-              <a:rPr lang="en-US" sz="1400">
-                <a:latin typeface="Courier"/>
-                <a:cs typeface="Courier"/>
-              </a:rPr>
-              <a:t>&gt; cutpoints &lt;- quantile(maacs$logno2_new, seq(0, 1, length = 11), na.rm = TRUE)</a:t>
-            </a:r>
-          </a:p>
-          <a:p>
-            <a:endParaRPr lang="en-US" sz="1400">
+              <a:rPr lang="en-US" sz="1400" dirty="0">
+                <a:latin typeface="Courier"/>
+                <a:cs typeface="Courier"/>
+              </a:rPr>
+              <a:t>## Calculate the </a:t>
+            </a:r>
+            <a:r>
+              <a:rPr lang="en-US" sz="1400" dirty="0" err="1">
+                <a:latin typeface="Courier"/>
+                <a:cs typeface="Courier"/>
+              </a:rPr>
+              <a:t>deciles</a:t>
+            </a:r>
+            <a:r>
+              <a:rPr lang="en-US" sz="1400" dirty="0">
+                <a:latin typeface="Courier"/>
+                <a:cs typeface="Courier"/>
+              </a:rPr>
+              <a:t> of the data</a:t>
+            </a:r>
+          </a:p>
+          <a:p>
+            <a:r>
+              <a:rPr lang="en-US" sz="1400" dirty="0">
+                <a:latin typeface="Courier"/>
+                <a:cs typeface="Courier"/>
+              </a:rPr>
+              <a:t>&gt; </a:t>
+            </a:r>
+            <a:r>
+              <a:rPr lang="en-US" sz="1400" dirty="0" err="1">
+                <a:latin typeface="Courier"/>
+                <a:cs typeface="Courier"/>
+              </a:rPr>
+              <a:t>cutpoints</a:t>
+            </a:r>
+            <a:r>
+              <a:rPr lang="en-US" sz="1400" dirty="0">
+                <a:latin typeface="Courier"/>
+                <a:cs typeface="Courier"/>
+              </a:rPr>
+              <a:t> &lt;- quantile(maacs$logno2_new, </a:t>
+            </a:r>
+            <a:r>
+              <a:rPr lang="en-US" sz="1400" dirty="0" err="1">
+                <a:latin typeface="Courier"/>
+                <a:cs typeface="Courier"/>
+              </a:rPr>
+              <a:t>seq</a:t>
+            </a:r>
+            <a:r>
+              <a:rPr lang="en-US" sz="1400" dirty="0">
+                <a:latin typeface="Courier"/>
+                <a:cs typeface="Courier"/>
+              </a:rPr>
+              <a:t>(0, 1, length = 11), na.rm = TRUE)</a:t>
+            </a:r>
+          </a:p>
+          <a:p>
+            <a:endParaRPr lang="en-US" sz="1400" dirty="0">
               <a:latin typeface="Courier"/>
               <a:cs typeface="Courier"/>
             </a:endParaRPr>
           </a:p>
           <a:p>
             <a:r>
-              <a:rPr lang="en-US" sz="1400">
-                <a:latin typeface="Courier"/>
-                <a:cs typeface="Courier"/>
-              </a:rPr>
-              <a:t>## Cut the data at the deciles and create a new factor variable</a:t>
-            </a:r>
-          </a:p>
-          <a:p>
-            <a:r>
-              <a:rPr lang="en-US" sz="1400">
-                <a:latin typeface="Courier"/>
-                <a:cs typeface="Courier"/>
-              </a:rPr>
-              <a:t>&gt; maacs$no2dec &lt;- cut(maacs$logno2_new, cutpoints)</a:t>
-            </a:r>
-          </a:p>
-          <a:p>
-            <a:endParaRPr lang="en-US" sz="1400">
+              <a:rPr lang="en-US" sz="1400" dirty="0">
+                <a:latin typeface="Courier"/>
+                <a:cs typeface="Courier"/>
+              </a:rPr>
+              <a:t>## Cut the data at the </a:t>
+            </a:r>
+            <a:r>
+              <a:rPr lang="en-US" sz="1400" dirty="0" err="1">
+                <a:latin typeface="Courier"/>
+                <a:cs typeface="Courier"/>
+              </a:rPr>
+              <a:t>deciles</a:t>
+            </a:r>
+            <a:r>
+              <a:rPr lang="en-US" sz="1400" dirty="0">
+                <a:latin typeface="Courier"/>
+                <a:cs typeface="Courier"/>
+              </a:rPr>
+              <a:t> and create a new factor variable</a:t>
+            </a:r>
+          </a:p>
+          <a:p>
+            <a:r>
+              <a:rPr lang="en-US" sz="1400" dirty="0">
+                <a:latin typeface="Courier"/>
+                <a:cs typeface="Courier"/>
+              </a:rPr>
+              <a:t>&gt; maacs$no2dec &lt;- cut(maacs$logno2_new, </a:t>
+            </a:r>
+            <a:r>
+              <a:rPr lang="en-US" sz="1400" dirty="0" err="1">
+                <a:latin typeface="Courier"/>
+                <a:cs typeface="Courier"/>
+              </a:rPr>
+              <a:t>cutpoints</a:t>
+            </a:r>
+            <a:r>
+              <a:rPr lang="en-US" sz="1400" dirty="0">
+                <a:latin typeface="Courier"/>
+                <a:cs typeface="Courier"/>
+              </a:rPr>
+              <a:t>)</a:t>
+            </a:r>
+          </a:p>
+          <a:p>
+            <a:endParaRPr lang="en-US" sz="1400" dirty="0">
               <a:latin typeface="Courier"/>
               <a:cs typeface="Courier"/>
             </a:endParaRPr>
           </a:p>
           <a:p>
             <a:r>
-              <a:rPr lang="en-US" sz="1400">
+              <a:rPr lang="en-US" sz="1400" dirty="0">
                 <a:latin typeface="Courier"/>
                 <a:cs typeface="Courier"/>
               </a:rPr>
@@ -10437,7 +11142,7 @@
           </a:p>
           <a:p>
             <a:r>
-              <a:rPr lang="en-US" sz="1400">
+              <a:rPr lang="en-US" sz="1400" dirty="0">
                 <a:latin typeface="Courier"/>
                 <a:cs typeface="Courier"/>
               </a:rPr>
@@ -10446,7 +11151,7 @@
           </a:p>
           <a:p>
             <a:r>
-              <a:rPr lang="en-US" sz="1400">
+              <a:rPr lang="en-US" sz="1400" dirty="0">
                 <a:latin typeface="Courier"/>
                 <a:cs typeface="Courier"/>
               </a:rPr>
@@ -10455,7 +11160,7 @@
           </a:p>
           <a:p>
             <a:r>
-              <a:rPr lang="en-US" sz="1400">
+              <a:rPr lang="en-US" sz="1400" dirty="0">
                 <a:latin typeface="Courier"/>
                 <a:cs typeface="Courier"/>
               </a:rPr>
@@ -10464,7 +11169,7 @@
           </a:p>
           <a:p>
             <a:r>
-              <a:rPr lang="en-US" sz="1400">
+              <a:rPr lang="en-US" sz="1400" dirty="0">
                 <a:latin typeface="Courier"/>
                 <a:cs typeface="Courier"/>
               </a:rPr>
@@ -10472,7 +11177,7 @@
             </a:r>
           </a:p>
           <a:p>
-            <a:endParaRPr lang="en-US" sz="1400">
+            <a:endParaRPr lang="en-US" sz="1400" dirty="0">
               <a:latin typeface="Courier"/>
               <a:cs typeface="Courier"/>
             </a:endParaRPr>
@@ -10492,7 +11197,7 @@
   <p:timing>
     <p:tnLst>
       <p:par>
-        <p:cTn xmlns:p14="http://schemas.microsoft.com/office/powerpoint/2010/main" id="1" dur="indefinite" restart="never" nodeType="tmRoot"/>
+        <p:cTn id="1" dur="indefinite" restart="never" nodeType="tmRoot"/>
       </p:par>
     </p:tnLst>
   </p:timing>
@@ -10996,7 +11701,7 @@
   <p:timing>
     <p:tnLst>
       <p:par>
-        <p:cTn xmlns:p14="http://schemas.microsoft.com/office/powerpoint/2010/main" id="1" dur="indefinite" restart="never" nodeType="tmRoot">
+        <p:cTn id="1" dur="indefinite" restart="never" nodeType="tmRoot">
           <p:childTnLst>
             <p:seq concurrent="1" nextAc="seek">
               <p:cTn id="2" dur="indefinite" nodeType="mainSeq">
@@ -11453,7 +12158,7 @@
           <a:lstStyle/>
           <a:p>
             <a:r>
-              <a:rPr lang="en-US"/>
+              <a:rPr lang="en-US" dirty="0"/>
               <a:t>Code for Final Plot</a:t>
             </a:r>
           </a:p>
@@ -11482,31 +12187,101 @@
           <a:lstStyle/>
           <a:p>
             <a:r>
-              <a:rPr lang="en-US">
-                <a:latin typeface="Courier"/>
-                <a:cs typeface="Courier"/>
-              </a:rPr>
-              <a:t>## Setup ggplot with data frame</a:t>
-            </a:r>
-          </a:p>
-          <a:p>
-            <a:r>
-              <a:rPr lang="en-US">
-                <a:latin typeface="Courier"/>
-                <a:cs typeface="Courier"/>
-              </a:rPr>
-              <a:t>g &lt;- ggplot(maacs, aes(logpm25, NocturnalSympt))</a:t>
-            </a:r>
-          </a:p>
-          <a:p>
-            <a:endParaRPr lang="en-US">
+              <a:rPr lang="en-US" dirty="0">
+                <a:latin typeface="Courier"/>
+                <a:cs typeface="Courier"/>
+              </a:rPr>
+              <a:t>## Setup </a:t>
+            </a:r>
+            <a:r>
+              <a:rPr lang="en-US" dirty="0" err="1">
+                <a:latin typeface="Courier"/>
+                <a:cs typeface="Courier"/>
+              </a:rPr>
+              <a:t>ggplot</a:t>
+            </a:r>
+            <a:r>
+              <a:rPr lang="en-US" dirty="0">
+                <a:latin typeface="Courier"/>
+                <a:cs typeface="Courier"/>
+              </a:rPr>
+              <a:t> with data frame</a:t>
+            </a:r>
+          </a:p>
+          <a:p>
+            <a:r>
+              <a:rPr lang="en-US" dirty="0">
+                <a:latin typeface="Courier"/>
+                <a:cs typeface="Courier"/>
+              </a:rPr>
+              <a:t>g &lt;- </a:t>
+            </a:r>
+            <a:r>
+              <a:rPr lang="en-US" dirty="0" err="1">
+                <a:latin typeface="Courier"/>
+                <a:cs typeface="Courier"/>
+              </a:rPr>
+              <a:t>ggplot</a:t>
+            </a:r>
+            <a:r>
+              <a:rPr lang="en-US" dirty="0">
+                <a:latin typeface="Courier"/>
+                <a:cs typeface="Courier"/>
+              </a:rPr>
+              <a:t>(</a:t>
+            </a:r>
+            <a:r>
+              <a:rPr lang="en-US" dirty="0" err="1">
+                <a:latin typeface="Courier"/>
+                <a:cs typeface="Courier"/>
+              </a:rPr>
+              <a:t>maacs</a:t>
+            </a:r>
+            <a:r>
+              <a:rPr lang="en-US" dirty="0">
+                <a:latin typeface="Courier"/>
+                <a:cs typeface="Courier"/>
+              </a:rPr>
+              <a:t>, </a:t>
+            </a:r>
+            <a:r>
+              <a:rPr lang="en-US" dirty="0" err="1">
+                <a:latin typeface="Courier"/>
+                <a:cs typeface="Courier"/>
+              </a:rPr>
+              <a:t>aes</a:t>
+            </a:r>
+            <a:r>
+              <a:rPr lang="en-US" dirty="0">
+                <a:latin typeface="Courier"/>
+                <a:cs typeface="Courier"/>
+              </a:rPr>
+              <a:t>(logpm25, </a:t>
+            </a:r>
+            <a:r>
+              <a:rPr lang="en-US" dirty="0" err="1">
+                <a:latin typeface="Courier"/>
+                <a:cs typeface="Courier"/>
+              </a:rPr>
+              <a:t>NocturnalSympt</a:t>
+            </a:r>
+            <a:r>
+              <a:rPr lang="en-US" dirty="0">
+                <a:latin typeface="Courier"/>
+                <a:cs typeface="Courier"/>
+              </a:rPr>
+              <a:t>))</a:t>
+            </a:r>
+          </a:p>
+          <a:p>
+            <a:endParaRPr lang="en-US" dirty="0">
               <a:latin typeface="Courier"/>
               <a:cs typeface="Courier"/>
             </a:endParaRPr>
           </a:p>
           <a:p>
             <a:r>
-              <a:rPr lang="en-US">
+              <a:rPr lang="en-US" dirty="0">
                 <a:latin typeface="Courier"/>
                 <a:cs typeface="Courier"/>
               </a:rPr>
@@ -11515,43 +12290,197 @@
           </a:p>
           <a:p>
             <a:r>
-              <a:rPr lang="en-US">
-                <a:latin typeface="Courier"/>
-                <a:cs typeface="Courier"/>
-              </a:rPr>
-              <a:t>g + geom_point(alpha = 1/3) </a:t>
-            </a:r>
-          </a:p>
-          <a:p>
-            <a:r>
-              <a:rPr lang="en-US">
-                <a:latin typeface="Courier"/>
-                <a:cs typeface="Courier"/>
-              </a:rPr>
-              <a:t>  + facet_wrap(bmicat ~ no2dec, nrow = 2, ncol = 4) </a:t>
-            </a:r>
-          </a:p>
-          <a:p>
-            <a:r>
-              <a:rPr lang="en-US">
-                <a:latin typeface="Courier"/>
-                <a:cs typeface="Courier"/>
-              </a:rPr>
-              <a:t>  + geom_smooth(method="lm", se=FALSE, col="steelblue")      </a:t>
-            </a:r>
-          </a:p>
-          <a:p>
-            <a:r>
-              <a:rPr lang="en-US">
-                <a:latin typeface="Courier"/>
-                <a:cs typeface="Courier"/>
-              </a:rPr>
-              <a:t>  + theme_bw(base_family = "Avenir", base_size = 10) </a:t>
-            </a:r>
-          </a:p>
-          <a:p>
-            <a:r>
-              <a:rPr lang="en-US">
+              <a:rPr lang="en-US" dirty="0">
+                <a:latin typeface="Courier"/>
+                <a:cs typeface="Courier"/>
+              </a:rPr>
+              <a:t>g + </a:t>
+            </a:r>
+            <a:r>
+              <a:rPr lang="en-US" dirty="0" err="1">
+                <a:latin typeface="Courier"/>
+                <a:cs typeface="Courier"/>
+              </a:rPr>
+              <a:t>geom_point</a:t>
+            </a:r>
+            <a:r>
+              <a:rPr lang="en-US" dirty="0">
+                <a:latin typeface="Courier"/>
+                <a:cs typeface="Courier"/>
+              </a:rPr>
+              <a:t>(alpha = 1/3) </a:t>
+            </a:r>
+          </a:p>
+          <a:p>
+            <a:r>
+              <a:rPr lang="en-US" dirty="0">
+                <a:latin typeface="Courier"/>
+                <a:cs typeface="Courier"/>
+              </a:rPr>
+              <a:t>  + </a:t>
+            </a:r>
+            <a:r>
+              <a:rPr lang="en-US" dirty="0" err="1">
+                <a:latin typeface="Courier"/>
+                <a:cs typeface="Courier"/>
+              </a:rPr>
+              <a:t>facet_wrap</a:t>
+            </a:r>
+            <a:r>
+              <a:rPr lang="en-US" dirty="0">
+                <a:latin typeface="Courier"/>
+                <a:cs typeface="Courier"/>
+              </a:rPr>
+              <a:t>(</a:t>
+            </a:r>
+            <a:r>
+              <a:rPr lang="en-US" dirty="0" err="1">
+                <a:latin typeface="Courier"/>
+                <a:cs typeface="Courier"/>
+              </a:rPr>
+              <a:t>bmicat</a:t>
+            </a:r>
+            <a:r>
+              <a:rPr lang="en-US" dirty="0">
+                <a:latin typeface="Courier"/>
+                <a:cs typeface="Courier"/>
+              </a:rPr>
+              <a:t> ~ no2dec, </a:t>
+            </a:r>
+            <a:r>
+              <a:rPr lang="en-US" dirty="0" err="1">
+                <a:latin typeface="Courier"/>
+                <a:cs typeface="Courier"/>
+              </a:rPr>
+              <a:t>nrow</a:t>
+            </a:r>
+            <a:r>
+              <a:rPr lang="en-US" dirty="0">
+                <a:latin typeface="Courier"/>
+                <a:cs typeface="Courier"/>
+              </a:rPr>
+              <a:t> = 2, </a:t>
+            </a:r>
+            <a:r>
+              <a:rPr lang="en-US" dirty="0" err="1">
+                <a:latin typeface="Courier"/>
+                <a:cs typeface="Courier"/>
+              </a:rPr>
+              <a:t>ncol</a:t>
+            </a:r>
+            <a:r>
+              <a:rPr lang="en-US" dirty="0">
+                <a:latin typeface="Courier"/>
+                <a:cs typeface="Courier"/>
+              </a:rPr>
+              <a:t> = 4) </a:t>
+            </a:r>
+          </a:p>
+          <a:p>
+            <a:r>
+              <a:rPr lang="en-US" dirty="0">
+                <a:latin typeface="Courier"/>
+                <a:cs typeface="Courier"/>
+              </a:rPr>
+              <a:t>  + </a:t>
+            </a:r>
+            <a:r>
+              <a:rPr lang="en-US" dirty="0" err="1">
+                <a:latin typeface="Courier"/>
+                <a:cs typeface="Courier"/>
+              </a:rPr>
+              <a:t>geom_smooth</a:t>
+            </a:r>
+            <a:r>
+              <a:rPr lang="en-US" dirty="0">
+                <a:latin typeface="Courier"/>
+                <a:cs typeface="Courier"/>
+              </a:rPr>
+              <a:t>(method="lm", se=FALSE, col="</a:t>
+            </a:r>
+            <a:r>
+              <a:rPr lang="en-US" dirty="0" err="1">
+                <a:latin typeface="Courier"/>
+                <a:cs typeface="Courier"/>
+              </a:rPr>
+              <a:t>steelblue</a:t>
+            </a:r>
+            <a:r>
+              <a:rPr lang="en-US" dirty="0">
+                <a:latin typeface="Courier"/>
+                <a:cs typeface="Courier"/>
+              </a:rPr>
+              <a:t>")      </a:t>
+            </a:r>
+          </a:p>
+          <a:p>
+            <a:r>
+              <a:rPr lang="en-US" dirty="0">
+                <a:latin typeface="Courier"/>
+                <a:cs typeface="Courier"/>
+              </a:rPr>
+              <a:t>  + </a:t>
+            </a:r>
+            <a:r>
+              <a:rPr lang="en-US" dirty="0" err="1">
+                <a:latin typeface="Courier"/>
+                <a:cs typeface="Courier"/>
+              </a:rPr>
+              <a:t>theme_bw</a:t>
+            </a:r>
+            <a:r>
+              <a:rPr lang="en-US" dirty="0">
+                <a:latin typeface="Courier"/>
+                <a:cs typeface="Courier"/>
+              </a:rPr>
+              <a:t>(</a:t>
+            </a:r>
+            <a:r>
+              <a:rPr lang="en-US" dirty="0" err="1">
+                <a:latin typeface="Courier"/>
+                <a:cs typeface="Courier"/>
+              </a:rPr>
+              <a:t>base_family</a:t>
+            </a:r>
+            <a:r>
+              <a:rPr lang="en-US" dirty="0">
+                <a:latin typeface="Courier"/>
+                <a:cs typeface="Courier"/>
+              </a:rPr>
+              <a:t> = "</a:t>
+            </a:r>
+            <a:r>
+              <a:rPr lang="en-US" dirty="0" err="1">
+                <a:latin typeface="Courier"/>
+                <a:cs typeface="Courier"/>
+              </a:rPr>
+              <a:t>Avenir</a:t>
+            </a:r>
+            <a:r>
+              <a:rPr lang="en-US" dirty="0">
+                <a:latin typeface="Courier"/>
+                <a:cs typeface="Courier"/>
+              </a:rPr>
+              <a:t>", </a:t>
+            </a:r>
+            <a:r>
+              <a:rPr lang="en-US" dirty="0" err="1">
+                <a:latin typeface="Courier"/>
+                <a:cs typeface="Courier"/>
+              </a:rPr>
+              <a:t>base_size</a:t>
+            </a:r>
+            <a:r>
+              <a:rPr lang="en-US" dirty="0">
+                <a:latin typeface="Courier"/>
+                <a:cs typeface="Courier"/>
+              </a:rPr>
+              <a:t> = 10) </a:t>
+            </a:r>
+          </a:p>
+          <a:p>
+            <a:r>
+              <a:rPr lang="en-US" dirty="0">
                 <a:latin typeface="Courier"/>
                 <a:cs typeface="Courier"/>
               </a:rPr>
@@ -11560,7 +12489,7 @@
           </a:p>
           <a:p>
             <a:r>
-              <a:rPr lang="en-US">
+              <a:rPr lang="en-US" dirty="0">
                 <a:latin typeface="Courier"/>
                 <a:cs typeface="Courier"/>
               </a:rPr>
@@ -11569,7 +12498,7 @@
           </a:p>
           <a:p>
             <a:r>
-              <a:rPr lang="en-US">
+              <a:rPr lang="en-US" dirty="0">
                 <a:latin typeface="Courier"/>
                 <a:cs typeface="Courier"/>
               </a:rPr>
@@ -11971,7 +12900,7 @@
   <p:timing>
     <p:tnLst>
       <p:par>
-        <p:cTn xmlns:p14="http://schemas.microsoft.com/office/powerpoint/2010/main" id="1" dur="indefinite" restart="never" nodeType="tmRoot"/>
+        <p:cTn id="1" dur="indefinite" restart="never" nodeType="tmRoot"/>
       </p:par>
     </p:tnLst>
   </p:timing>
@@ -12060,7 +12989,7 @@
   <p:timing>
     <p:tnLst>
       <p:par>
-        <p:cTn xmlns:p14="http://schemas.microsoft.com/office/powerpoint/2010/main" id="1" dur="indefinite" restart="never" nodeType="tmRoot"/>
+        <p:cTn id="1" dur="indefinite" restart="never" nodeType="tmRoot"/>
       </p:par>
     </p:tnLst>
   </p:timing>
@@ -12100,15 +13029,22 @@
           <a:lstStyle/>
           <a:p>
             <a:r>
-              <a:rPr lang="en-US"/>
+              <a:rPr lang="en-US" dirty="0"/>
               <a:t>The Basics: </a:t>
             </a:r>
             <a:r>
-              <a:rPr lang="en-US" sz="3600">
-                <a:latin typeface="Courier"/>
-                <a:cs typeface="Courier"/>
-              </a:rPr>
-              <a:t>qplot()</a:t>
+              <a:rPr lang="en-US" sz="3600" dirty="0" err="1">
+                <a:latin typeface="Courier"/>
+                <a:cs typeface="Courier"/>
+              </a:rPr>
+              <a:t>qplot</a:t>
+            </a:r>
+            <a:r>
+              <a:rPr lang="en-US" sz="3600" dirty="0">
+                <a:latin typeface="Courier"/>
+                <a:cs typeface="Courier"/>
+              </a:rPr>
+              <a:t>()</a:t>
             </a:r>
           </a:p>
         </p:txBody>
@@ -12131,46 +13067,46 @@
           <a:lstStyle/>
           <a:p>
             <a:r>
-              <a:rPr lang="en-US"/>
+              <a:rPr lang="en-US" dirty="0"/>
               <a:t>Works much like the </a:t>
             </a:r>
             <a:r>
-              <a:rPr lang="en-US">
+              <a:rPr lang="en-US" dirty="0">
                 <a:latin typeface="Courier"/>
                 <a:cs typeface="Courier"/>
               </a:rPr>
               <a:t>plot</a:t>
             </a:r>
             <a:r>
-              <a:rPr lang="en-US"/>
+              <a:rPr lang="en-US" dirty="0"/>
               <a:t> function in base graphics system</a:t>
             </a:r>
           </a:p>
           <a:p>
             <a:r>
-              <a:rPr lang="en-US"/>
+              <a:rPr lang="en-US" dirty="0"/>
               <a:t>Looks for data in a data frame, similar to lattice, or in the parent environment</a:t>
             </a:r>
           </a:p>
           <a:p>
             <a:r>
-              <a:rPr lang="en-US"/>
+              <a:rPr lang="en-US" dirty="0"/>
               <a:t>Plots are made up of </a:t>
             </a:r>
             <a:r>
-              <a:rPr lang="en-US" i="1"/>
+              <a:rPr lang="en-US" i="1" dirty="0"/>
               <a:t>aesthetics</a:t>
             </a:r>
             <a:r>
-              <a:rPr lang="en-US"/>
+              <a:rPr lang="en-US" dirty="0"/>
               <a:t> (size, shape, color) and </a:t>
             </a:r>
             <a:r>
-              <a:rPr lang="en-US" i="1"/>
+              <a:rPr lang="en-US" i="1" dirty="0" err="1"/>
               <a:t>geoms</a:t>
             </a:r>
             <a:r>
-              <a:rPr lang="en-US"/>
+              <a:rPr lang="en-US" dirty="0"/>
               <a:t> (points, lines)</a:t>
             </a:r>
           </a:p>
@@ -12189,7 +13125,7 @@
   <p:timing>
     <p:tnLst>
       <p:par>
-        <p:cTn xmlns:p14="http://schemas.microsoft.com/office/powerpoint/2010/main" id="1" dur="indefinite" restart="never" nodeType="tmRoot"/>
+        <p:cTn id="1" dur="indefinite" restart="never" nodeType="tmRoot"/>
       </p:par>
     </p:tnLst>
   </p:timing>
@@ -12229,17 +13165,24 @@
           <a:lstStyle/>
           <a:p>
             <a:r>
-              <a:rPr lang="en-US"/>
+              <a:rPr lang="en-US" dirty="0"/>
               <a:t>The Basics: </a:t>
             </a:r>
             <a:r>
-              <a:rPr lang="en-US" sz="3600">
-                <a:latin typeface="Courier"/>
-                <a:cs typeface="Courier"/>
-              </a:rPr>
-              <a:t>qplot()</a:t>
-            </a:r>
-            <a:endParaRPr lang="en-US"/>
+              <a:rPr lang="en-US" sz="3600" dirty="0" err="1">
+                <a:latin typeface="Courier"/>
+                <a:cs typeface="Courier"/>
+              </a:rPr>
+              <a:t>qplot</a:t>
+            </a:r>
+            <a:r>
+              <a:rPr lang="en-US" sz="3600" dirty="0">
+                <a:latin typeface="Courier"/>
+                <a:cs typeface="Courier"/>
+              </a:rPr>
+              <a:t>()</a:t>
+            </a:r>
+            <a:endParaRPr lang="en-US" dirty="0"/>
           </a:p>
         </p:txBody>
       </p:sp>
@@ -12261,24 +13204,44 @@
           <a:lstStyle/>
           <a:p>
             <a:r>
-              <a:rPr lang="en-US"/>
+              <a:rPr lang="en-US" dirty="0"/>
               <a:t>Factors are important for indicating subsets of the data (if they are to have different properties); they should be </a:t>
             </a:r>
             <a:r>
-              <a:rPr lang="en-US" b="1"/>
+              <a:rPr lang="en-US" b="1" dirty="0"/>
               <a:t>labeled</a:t>
             </a:r>
           </a:p>
           <a:p>
             <a:r>
-              <a:rPr lang="en-US"/>
-              <a:t>The qplot() hides what goes on underneath, which is okay for most operations</a:t>
-            </a:r>
-          </a:p>
-          <a:p>
-            <a:r>
-              <a:rPr lang="en-US"/>
-              <a:t>ggplot() is the core function and very flexible for doing things qplot() cannot do</a:t>
+              <a:rPr lang="en-US" dirty="0"/>
+              <a:t>The </a:t>
+            </a:r>
+            <a:r>
+              <a:rPr lang="en-US" dirty="0" err="1"/>
+              <a:t>qplot</a:t>
+            </a:r>
+            <a:r>
+              <a:rPr lang="en-US" dirty="0"/>
+              <a:t>() hides what goes on underneath, which is okay for most operations</a:t>
+            </a:r>
+          </a:p>
+          <a:p>
+            <a:r>
+              <a:rPr lang="en-US" dirty="0" err="1"/>
+              <a:t>ggplot</a:t>
+            </a:r>
+            <a:r>
+              <a:rPr lang="en-US" dirty="0"/>
+              <a:t>() is the core function and very flexible for doing things </a:t>
+            </a:r>
+            <a:r>
+              <a:rPr lang="en-US" dirty="0" err="1"/>
+              <a:t>qplot</a:t>
+            </a:r>
+            <a:r>
+              <a:rPr lang="en-US" dirty="0"/>
+              <a:t>() cannot do</a:t>
             </a:r>
           </a:p>
         </p:txBody>
@@ -12489,7 +13452,7 @@
   <p:timing>
     <p:tnLst>
       <p:par>
-        <p:cTn xmlns:p14="http://schemas.microsoft.com/office/powerpoint/2010/main" id="1" dur="indefinite" restart="never" nodeType="tmRoot">
+        <p:cTn id="1" dur="indefinite" restart="never" nodeType="tmRoot">
           <p:childTnLst>
             <p:seq concurrent="1" nextAc="seek">
               <p:cTn id="2" dur="indefinite" nodeType="mainSeq">
@@ -12960,7 +13923,7 @@
   <p:timing>
     <p:tnLst>
       <p:par>
-        <p:cTn xmlns:p14="http://schemas.microsoft.com/office/powerpoint/2010/main" id="1" dur="indefinite" restart="never" nodeType="tmRoot"/>
+        <p:cTn id="1" dur="indefinite" restart="never" nodeType="tmRoot"/>
       </p:par>
     </p:tnLst>
   </p:timing>
@@ -13059,8 +14022,36 @@
           <a:lstStyle/>
           <a:p>
             <a:r>
-              <a:rPr lang="en-US"/>
-              <a:t>qplot(displ, hwy, data = mpg, color = drv)</a:t>
+              <a:rPr lang="en-US" dirty="0" err="1"/>
+              <a:t>qplot</a:t>
+            </a:r>
+            <a:r>
+              <a:rPr lang="en-US" dirty="0"/>
+              <a:t>(</a:t>
+            </a:r>
+            <a:r>
+              <a:rPr lang="en-US" dirty="0" err="1"/>
+              <a:t>displ</a:t>
+            </a:r>
+            <a:r>
+              <a:rPr lang="en-US" dirty="0"/>
+              <a:t>, </a:t>
+            </a:r>
+            <a:r>
+              <a:rPr lang="en-US" dirty="0" err="1"/>
+              <a:t>hwy</a:t>
+            </a:r>
+            <a:r>
+              <a:rPr lang="en-US" dirty="0"/>
+              <a:t>, data = mpg, color = </a:t>
+            </a:r>
+            <a:r>
+              <a:rPr lang="en-US" dirty="0" err="1"/>
+              <a:t>drv</a:t>
+            </a:r>
+            <a:r>
+              <a:rPr lang="en-US" dirty="0"/>
+              <a:t>)</a:t>
             </a:r>
           </a:p>
         </p:txBody>
@@ -13230,7 +14221,7 @@
   <p:timing>
     <p:tnLst>
       <p:par>
-        <p:cTn xmlns:p14="http://schemas.microsoft.com/office/powerpoint/2010/main" id="1" dur="indefinite" restart="never" nodeType="tmRoot"/>
+        <p:cTn id="1" dur="indefinite" restart="never" nodeType="tmRoot"/>
       </p:par>
     </p:tnLst>
   </p:timing>

</xml_diff>